<commit_message>
add flow and explanations
</commit_message>
<xml_diff>
--- a/docs/SAGA_implementation.pptx
+++ b/docs/SAGA_implementation.pptx
@@ -10521,6 +10521,310 @@
       </p:grpSpPr>
       <p:sp>
         <p:nvSpPr>
+          <p:cNvPr id="87" name="Rounded Rectangle 86">
+            <a:extLst>
+              <a:ext uri="{FF2B5EF4-FFF2-40B4-BE49-F238E27FC236}">
+                <a16:creationId xmlns:a16="http://schemas.microsoft.com/office/drawing/2014/main" id="{8721E105-8C5C-27B7-DDF1-709BAE6ED955}"/>
+              </a:ext>
+            </a:extLst>
+          </p:cNvPr>
+          <p:cNvSpPr/>
+          <p:nvPr/>
+        </p:nvSpPr>
+        <p:spPr>
+          <a:xfrm>
+            <a:off x="9619281" y="4696242"/>
+            <a:ext cx="2204269" cy="1628131"/>
+          </a:xfrm>
+          <a:custGeom>
+            <a:avLst/>
+            <a:gdLst>
+              <a:gd name="connsiteX0" fmla="*/ 0 w 2204269"/>
+              <a:gd name="connsiteY0" fmla="*/ 271361 h 1628131"/>
+              <a:gd name="connsiteX1" fmla="*/ 271361 w 2204269"/>
+              <a:gd name="connsiteY1" fmla="*/ 0 h 1628131"/>
+              <a:gd name="connsiteX2" fmla="*/ 841825 w 2204269"/>
+              <a:gd name="connsiteY2" fmla="*/ 0 h 1628131"/>
+              <a:gd name="connsiteX3" fmla="*/ 1362444 w 2204269"/>
+              <a:gd name="connsiteY3" fmla="*/ 0 h 1628131"/>
+              <a:gd name="connsiteX4" fmla="*/ 1932908 w 2204269"/>
+              <a:gd name="connsiteY4" fmla="*/ 0 h 1628131"/>
+              <a:gd name="connsiteX5" fmla="*/ 2204269 w 2204269"/>
+              <a:gd name="connsiteY5" fmla="*/ 271361 h 1628131"/>
+              <a:gd name="connsiteX6" fmla="*/ 2204269 w 2204269"/>
+              <a:gd name="connsiteY6" fmla="*/ 792357 h 1628131"/>
+              <a:gd name="connsiteX7" fmla="*/ 2204269 w 2204269"/>
+              <a:gd name="connsiteY7" fmla="*/ 1356770 h 1628131"/>
+              <a:gd name="connsiteX8" fmla="*/ 1932908 w 2204269"/>
+              <a:gd name="connsiteY8" fmla="*/ 1628131 h 1628131"/>
+              <a:gd name="connsiteX9" fmla="*/ 1345828 w 2204269"/>
+              <a:gd name="connsiteY9" fmla="*/ 1628131 h 1628131"/>
+              <a:gd name="connsiteX10" fmla="*/ 775364 w 2204269"/>
+              <a:gd name="connsiteY10" fmla="*/ 1628131 h 1628131"/>
+              <a:gd name="connsiteX11" fmla="*/ 271361 w 2204269"/>
+              <a:gd name="connsiteY11" fmla="*/ 1628131 h 1628131"/>
+              <a:gd name="connsiteX12" fmla="*/ 0 w 2204269"/>
+              <a:gd name="connsiteY12" fmla="*/ 1356770 h 1628131"/>
+              <a:gd name="connsiteX13" fmla="*/ 0 w 2204269"/>
+              <a:gd name="connsiteY13" fmla="*/ 814066 h 1628131"/>
+              <a:gd name="connsiteX14" fmla="*/ 0 w 2204269"/>
+              <a:gd name="connsiteY14" fmla="*/ 271361 h 1628131"/>
+            </a:gdLst>
+            <a:ahLst/>
+            <a:cxnLst>
+              <a:cxn ang="0">
+                <a:pos x="connsiteX0" y="connsiteY0"/>
+              </a:cxn>
+              <a:cxn ang="0">
+                <a:pos x="connsiteX1" y="connsiteY1"/>
+              </a:cxn>
+              <a:cxn ang="0">
+                <a:pos x="connsiteX2" y="connsiteY2"/>
+              </a:cxn>
+              <a:cxn ang="0">
+                <a:pos x="connsiteX3" y="connsiteY3"/>
+              </a:cxn>
+              <a:cxn ang="0">
+                <a:pos x="connsiteX4" y="connsiteY4"/>
+              </a:cxn>
+              <a:cxn ang="0">
+                <a:pos x="connsiteX5" y="connsiteY5"/>
+              </a:cxn>
+              <a:cxn ang="0">
+                <a:pos x="connsiteX6" y="connsiteY6"/>
+              </a:cxn>
+              <a:cxn ang="0">
+                <a:pos x="connsiteX7" y="connsiteY7"/>
+              </a:cxn>
+              <a:cxn ang="0">
+                <a:pos x="connsiteX8" y="connsiteY8"/>
+              </a:cxn>
+              <a:cxn ang="0">
+                <a:pos x="connsiteX9" y="connsiteY9"/>
+              </a:cxn>
+              <a:cxn ang="0">
+                <a:pos x="connsiteX10" y="connsiteY10"/>
+              </a:cxn>
+              <a:cxn ang="0">
+                <a:pos x="connsiteX11" y="connsiteY11"/>
+              </a:cxn>
+              <a:cxn ang="0">
+                <a:pos x="connsiteX12" y="connsiteY12"/>
+              </a:cxn>
+              <a:cxn ang="0">
+                <a:pos x="connsiteX13" y="connsiteY13"/>
+              </a:cxn>
+              <a:cxn ang="0">
+                <a:pos x="connsiteX14" y="connsiteY14"/>
+              </a:cxn>
+            </a:cxnLst>
+            <a:rect l="l" t="t" r="r" b="b"/>
+            <a:pathLst>
+              <a:path w="2204269" h="1628131" fill="none" extrusionOk="0">
+                <a:moveTo>
+                  <a:pt x="0" y="271361"/>
+                </a:moveTo>
+                <a:cubicBezTo>
+                  <a:pt x="-4611" y="112092"/>
+                  <a:pt x="122443" y="-12861"/>
+                  <a:pt x="271361" y="0"/>
+                </a:cubicBezTo>
+                <a:cubicBezTo>
+                  <a:pt x="397688" y="-16383"/>
+                  <a:pt x="656993" y="517"/>
+                  <a:pt x="841825" y="0"/>
+                </a:cubicBezTo>
+                <a:cubicBezTo>
+                  <a:pt x="1026657" y="-517"/>
+                  <a:pt x="1177441" y="12132"/>
+                  <a:pt x="1362444" y="0"/>
+                </a:cubicBezTo>
+                <a:cubicBezTo>
+                  <a:pt x="1547447" y="-12132"/>
+                  <a:pt x="1687527" y="-27016"/>
+                  <a:pt x="1932908" y="0"/>
+                </a:cubicBezTo>
+                <a:cubicBezTo>
+                  <a:pt x="2107131" y="-5153"/>
+                  <a:pt x="2205009" y="128521"/>
+                  <a:pt x="2204269" y="271361"/>
+                </a:cubicBezTo>
+                <a:cubicBezTo>
+                  <a:pt x="2228557" y="519796"/>
+                  <a:pt x="2184920" y="546244"/>
+                  <a:pt x="2204269" y="792357"/>
+                </a:cubicBezTo>
+                <a:cubicBezTo>
+                  <a:pt x="2223618" y="1038470"/>
+                  <a:pt x="2181764" y="1160261"/>
+                  <a:pt x="2204269" y="1356770"/>
+                </a:cubicBezTo>
+                <a:cubicBezTo>
+                  <a:pt x="2207441" y="1496882"/>
+                  <a:pt x="2107381" y="1654734"/>
+                  <a:pt x="1932908" y="1628131"/>
+                </a:cubicBezTo>
+                <a:cubicBezTo>
+                  <a:pt x="1710769" y="1618364"/>
+                  <a:pt x="1557504" y="1639780"/>
+                  <a:pt x="1345828" y="1628131"/>
+                </a:cubicBezTo>
+                <a:cubicBezTo>
+                  <a:pt x="1134152" y="1616482"/>
+                  <a:pt x="993467" y="1631012"/>
+                  <a:pt x="775364" y="1628131"/>
+                </a:cubicBezTo>
+                <a:cubicBezTo>
+                  <a:pt x="557261" y="1625250"/>
+                  <a:pt x="442458" y="1606928"/>
+                  <a:pt x="271361" y="1628131"/>
+                </a:cubicBezTo>
+                <a:cubicBezTo>
+                  <a:pt x="111686" y="1658701"/>
+                  <a:pt x="-5748" y="1488538"/>
+                  <a:pt x="0" y="1356770"/>
+                </a:cubicBezTo>
+                <a:cubicBezTo>
+                  <a:pt x="-16816" y="1221110"/>
+                  <a:pt x="12254" y="1074535"/>
+                  <a:pt x="0" y="814066"/>
+                </a:cubicBezTo>
+                <a:cubicBezTo>
+                  <a:pt x="-12254" y="553597"/>
+                  <a:pt x="6308" y="430667"/>
+                  <a:pt x="0" y="271361"/>
+                </a:cubicBezTo>
+                <a:close/>
+              </a:path>
+              <a:path w="2204269" h="1628131" stroke="0" extrusionOk="0">
+                <a:moveTo>
+                  <a:pt x="0" y="271361"/>
+                </a:moveTo>
+                <a:cubicBezTo>
+                  <a:pt x="-21322" y="108340"/>
+                  <a:pt x="100812" y="7762"/>
+                  <a:pt x="271361" y="0"/>
+                </a:cubicBezTo>
+                <a:cubicBezTo>
+                  <a:pt x="483034" y="15321"/>
+                  <a:pt x="567450" y="3871"/>
+                  <a:pt x="858441" y="0"/>
+                </a:cubicBezTo>
+                <a:cubicBezTo>
+                  <a:pt x="1149432" y="-3871"/>
+                  <a:pt x="1183641" y="26619"/>
+                  <a:pt x="1395674" y="0"/>
+                </a:cubicBezTo>
+                <a:cubicBezTo>
+                  <a:pt x="1607707" y="-26619"/>
+                  <a:pt x="1716805" y="-15169"/>
+                  <a:pt x="1932908" y="0"/>
+                </a:cubicBezTo>
+                <a:cubicBezTo>
+                  <a:pt x="2073291" y="-30553"/>
+                  <a:pt x="2210746" y="97522"/>
+                  <a:pt x="2204269" y="271361"/>
+                </a:cubicBezTo>
+                <a:cubicBezTo>
+                  <a:pt x="2182057" y="425483"/>
+                  <a:pt x="2194462" y="613208"/>
+                  <a:pt x="2204269" y="792357"/>
+                </a:cubicBezTo>
+                <a:cubicBezTo>
+                  <a:pt x="2214076" y="971506"/>
+                  <a:pt x="2229091" y="1101317"/>
+                  <a:pt x="2204269" y="1356770"/>
+                </a:cubicBezTo>
+                <a:cubicBezTo>
+                  <a:pt x="2194543" y="1522729"/>
+                  <a:pt x="2067300" y="1610180"/>
+                  <a:pt x="1932908" y="1628131"/>
+                </a:cubicBezTo>
+                <a:cubicBezTo>
+                  <a:pt x="1694601" y="1651138"/>
+                  <a:pt x="1562900" y="1624912"/>
+                  <a:pt x="1412290" y="1628131"/>
+                </a:cubicBezTo>
+                <a:cubicBezTo>
+                  <a:pt x="1261680" y="1631350"/>
+                  <a:pt x="1054546" y="1616809"/>
+                  <a:pt x="858441" y="1628131"/>
+                </a:cubicBezTo>
+                <a:cubicBezTo>
+                  <a:pt x="662336" y="1639453"/>
+                  <a:pt x="531863" y="1649899"/>
+                  <a:pt x="271361" y="1628131"/>
+                </a:cubicBezTo>
+                <a:cubicBezTo>
+                  <a:pt x="131174" y="1639991"/>
+                  <a:pt x="20114" y="1489028"/>
+                  <a:pt x="0" y="1356770"/>
+                </a:cubicBezTo>
+                <a:cubicBezTo>
+                  <a:pt x="-16598" y="1238352"/>
+                  <a:pt x="-13601" y="980876"/>
+                  <a:pt x="0" y="814066"/>
+                </a:cubicBezTo>
+                <a:cubicBezTo>
+                  <a:pt x="13601" y="647256"/>
+                  <a:pt x="-20388" y="503804"/>
+                  <a:pt x="0" y="271361"/>
+                </a:cubicBezTo>
+                <a:close/>
+              </a:path>
+            </a:pathLst>
+          </a:custGeom>
+          <a:solidFill>
+            <a:srgbClr val="FF0000">
+              <a:alpha val="24000"/>
+            </a:srgbClr>
+          </a:solidFill>
+          <a:ln>
+            <a:solidFill>
+              <a:srgbClr val="C00000"/>
+            </a:solidFill>
+            <a:prstDash val="dash"/>
+            <a:extLst>
+              <a:ext uri="{C807C97D-BFC1-408E-A445-0C87EB9F89A2}">
+                <ask:lineSketchStyleProps xmlns:ask="http://schemas.microsoft.com/office/drawing/2018/sketchyshapes" sd="1219033472">
+                  <a:prstGeom prst="roundRect">
+                    <a:avLst/>
+                  </a:prstGeom>
+                  <ask:type>
+                    <ask:lineSketchFreehand/>
+                  </ask:type>
+                </ask:lineSketchStyleProps>
+              </a:ext>
+            </a:extLst>
+          </a:ln>
+        </p:spPr>
+        <p:style>
+          <a:lnRef idx="2">
+            <a:schemeClr val="accent1">
+              <a:shade val="50000"/>
+            </a:schemeClr>
+          </a:lnRef>
+          <a:fillRef idx="1">
+            <a:schemeClr val="accent1"/>
+          </a:fillRef>
+          <a:effectRef idx="0">
+            <a:schemeClr val="accent1"/>
+          </a:effectRef>
+          <a:fontRef idx="minor">
+            <a:schemeClr val="lt1"/>
+          </a:fontRef>
+        </p:style>
+        <p:txBody>
+          <a:bodyPr rtlCol="0" anchor="ctr"/>
+          <a:lstStyle/>
+          <a:p>
+            <a:pPr algn="ctr"/>
+            <a:endParaRPr lang="en-US"/>
+          </a:p>
+        </p:txBody>
+      </p:sp>
+      <p:sp>
+        <p:nvSpPr>
           <p:cNvPr id="2" name="Title 1">
             <a:extLst>
               <a:ext uri="{FF2B5EF4-FFF2-40B4-BE49-F238E27FC236}">
@@ -17750,310 +18054,6 @@
       </p:sp>
       <p:sp>
         <p:nvSpPr>
-          <p:cNvPr id="87" name="Rounded Rectangle 86">
-            <a:extLst>
-              <a:ext uri="{FF2B5EF4-FFF2-40B4-BE49-F238E27FC236}">
-                <a16:creationId xmlns:a16="http://schemas.microsoft.com/office/drawing/2014/main" id="{8721E105-8C5C-27B7-DDF1-709BAE6ED955}"/>
-              </a:ext>
-            </a:extLst>
-          </p:cNvPr>
-          <p:cNvSpPr/>
-          <p:nvPr/>
-        </p:nvSpPr>
-        <p:spPr>
-          <a:xfrm>
-            <a:off x="9619281" y="4696242"/>
-            <a:ext cx="2204269" cy="1628131"/>
-          </a:xfrm>
-          <a:custGeom>
-            <a:avLst/>
-            <a:gdLst>
-              <a:gd name="connsiteX0" fmla="*/ 0 w 2204269"/>
-              <a:gd name="connsiteY0" fmla="*/ 271361 h 1628131"/>
-              <a:gd name="connsiteX1" fmla="*/ 271361 w 2204269"/>
-              <a:gd name="connsiteY1" fmla="*/ 0 h 1628131"/>
-              <a:gd name="connsiteX2" fmla="*/ 841825 w 2204269"/>
-              <a:gd name="connsiteY2" fmla="*/ 0 h 1628131"/>
-              <a:gd name="connsiteX3" fmla="*/ 1362444 w 2204269"/>
-              <a:gd name="connsiteY3" fmla="*/ 0 h 1628131"/>
-              <a:gd name="connsiteX4" fmla="*/ 1932908 w 2204269"/>
-              <a:gd name="connsiteY4" fmla="*/ 0 h 1628131"/>
-              <a:gd name="connsiteX5" fmla="*/ 2204269 w 2204269"/>
-              <a:gd name="connsiteY5" fmla="*/ 271361 h 1628131"/>
-              <a:gd name="connsiteX6" fmla="*/ 2204269 w 2204269"/>
-              <a:gd name="connsiteY6" fmla="*/ 792357 h 1628131"/>
-              <a:gd name="connsiteX7" fmla="*/ 2204269 w 2204269"/>
-              <a:gd name="connsiteY7" fmla="*/ 1356770 h 1628131"/>
-              <a:gd name="connsiteX8" fmla="*/ 1932908 w 2204269"/>
-              <a:gd name="connsiteY8" fmla="*/ 1628131 h 1628131"/>
-              <a:gd name="connsiteX9" fmla="*/ 1345828 w 2204269"/>
-              <a:gd name="connsiteY9" fmla="*/ 1628131 h 1628131"/>
-              <a:gd name="connsiteX10" fmla="*/ 775364 w 2204269"/>
-              <a:gd name="connsiteY10" fmla="*/ 1628131 h 1628131"/>
-              <a:gd name="connsiteX11" fmla="*/ 271361 w 2204269"/>
-              <a:gd name="connsiteY11" fmla="*/ 1628131 h 1628131"/>
-              <a:gd name="connsiteX12" fmla="*/ 0 w 2204269"/>
-              <a:gd name="connsiteY12" fmla="*/ 1356770 h 1628131"/>
-              <a:gd name="connsiteX13" fmla="*/ 0 w 2204269"/>
-              <a:gd name="connsiteY13" fmla="*/ 814066 h 1628131"/>
-              <a:gd name="connsiteX14" fmla="*/ 0 w 2204269"/>
-              <a:gd name="connsiteY14" fmla="*/ 271361 h 1628131"/>
-            </a:gdLst>
-            <a:ahLst/>
-            <a:cxnLst>
-              <a:cxn ang="0">
-                <a:pos x="connsiteX0" y="connsiteY0"/>
-              </a:cxn>
-              <a:cxn ang="0">
-                <a:pos x="connsiteX1" y="connsiteY1"/>
-              </a:cxn>
-              <a:cxn ang="0">
-                <a:pos x="connsiteX2" y="connsiteY2"/>
-              </a:cxn>
-              <a:cxn ang="0">
-                <a:pos x="connsiteX3" y="connsiteY3"/>
-              </a:cxn>
-              <a:cxn ang="0">
-                <a:pos x="connsiteX4" y="connsiteY4"/>
-              </a:cxn>
-              <a:cxn ang="0">
-                <a:pos x="connsiteX5" y="connsiteY5"/>
-              </a:cxn>
-              <a:cxn ang="0">
-                <a:pos x="connsiteX6" y="connsiteY6"/>
-              </a:cxn>
-              <a:cxn ang="0">
-                <a:pos x="connsiteX7" y="connsiteY7"/>
-              </a:cxn>
-              <a:cxn ang="0">
-                <a:pos x="connsiteX8" y="connsiteY8"/>
-              </a:cxn>
-              <a:cxn ang="0">
-                <a:pos x="connsiteX9" y="connsiteY9"/>
-              </a:cxn>
-              <a:cxn ang="0">
-                <a:pos x="connsiteX10" y="connsiteY10"/>
-              </a:cxn>
-              <a:cxn ang="0">
-                <a:pos x="connsiteX11" y="connsiteY11"/>
-              </a:cxn>
-              <a:cxn ang="0">
-                <a:pos x="connsiteX12" y="connsiteY12"/>
-              </a:cxn>
-              <a:cxn ang="0">
-                <a:pos x="connsiteX13" y="connsiteY13"/>
-              </a:cxn>
-              <a:cxn ang="0">
-                <a:pos x="connsiteX14" y="connsiteY14"/>
-              </a:cxn>
-            </a:cxnLst>
-            <a:rect l="l" t="t" r="r" b="b"/>
-            <a:pathLst>
-              <a:path w="2204269" h="1628131" fill="none" extrusionOk="0">
-                <a:moveTo>
-                  <a:pt x="0" y="271361"/>
-                </a:moveTo>
-                <a:cubicBezTo>
-                  <a:pt x="-4611" y="112092"/>
-                  <a:pt x="122443" y="-12861"/>
-                  <a:pt x="271361" y="0"/>
-                </a:cubicBezTo>
-                <a:cubicBezTo>
-                  <a:pt x="397688" y="-16383"/>
-                  <a:pt x="656993" y="517"/>
-                  <a:pt x="841825" y="0"/>
-                </a:cubicBezTo>
-                <a:cubicBezTo>
-                  <a:pt x="1026657" y="-517"/>
-                  <a:pt x="1177441" y="12132"/>
-                  <a:pt x="1362444" y="0"/>
-                </a:cubicBezTo>
-                <a:cubicBezTo>
-                  <a:pt x="1547447" y="-12132"/>
-                  <a:pt x="1687527" y="-27016"/>
-                  <a:pt x="1932908" y="0"/>
-                </a:cubicBezTo>
-                <a:cubicBezTo>
-                  <a:pt x="2107131" y="-5153"/>
-                  <a:pt x="2205009" y="128521"/>
-                  <a:pt x="2204269" y="271361"/>
-                </a:cubicBezTo>
-                <a:cubicBezTo>
-                  <a:pt x="2228557" y="519796"/>
-                  <a:pt x="2184920" y="546244"/>
-                  <a:pt x="2204269" y="792357"/>
-                </a:cubicBezTo>
-                <a:cubicBezTo>
-                  <a:pt x="2223618" y="1038470"/>
-                  <a:pt x="2181764" y="1160261"/>
-                  <a:pt x="2204269" y="1356770"/>
-                </a:cubicBezTo>
-                <a:cubicBezTo>
-                  <a:pt x="2207441" y="1496882"/>
-                  <a:pt x="2107381" y="1654734"/>
-                  <a:pt x="1932908" y="1628131"/>
-                </a:cubicBezTo>
-                <a:cubicBezTo>
-                  <a:pt x="1710769" y="1618364"/>
-                  <a:pt x="1557504" y="1639780"/>
-                  <a:pt x="1345828" y="1628131"/>
-                </a:cubicBezTo>
-                <a:cubicBezTo>
-                  <a:pt x="1134152" y="1616482"/>
-                  <a:pt x="993467" y="1631012"/>
-                  <a:pt x="775364" y="1628131"/>
-                </a:cubicBezTo>
-                <a:cubicBezTo>
-                  <a:pt x="557261" y="1625250"/>
-                  <a:pt x="442458" y="1606928"/>
-                  <a:pt x="271361" y="1628131"/>
-                </a:cubicBezTo>
-                <a:cubicBezTo>
-                  <a:pt x="111686" y="1658701"/>
-                  <a:pt x="-5748" y="1488538"/>
-                  <a:pt x="0" y="1356770"/>
-                </a:cubicBezTo>
-                <a:cubicBezTo>
-                  <a:pt x="-16816" y="1221110"/>
-                  <a:pt x="12254" y="1074535"/>
-                  <a:pt x="0" y="814066"/>
-                </a:cubicBezTo>
-                <a:cubicBezTo>
-                  <a:pt x="-12254" y="553597"/>
-                  <a:pt x="6308" y="430667"/>
-                  <a:pt x="0" y="271361"/>
-                </a:cubicBezTo>
-                <a:close/>
-              </a:path>
-              <a:path w="2204269" h="1628131" stroke="0" extrusionOk="0">
-                <a:moveTo>
-                  <a:pt x="0" y="271361"/>
-                </a:moveTo>
-                <a:cubicBezTo>
-                  <a:pt x="-21322" y="108340"/>
-                  <a:pt x="100812" y="7762"/>
-                  <a:pt x="271361" y="0"/>
-                </a:cubicBezTo>
-                <a:cubicBezTo>
-                  <a:pt x="483034" y="15321"/>
-                  <a:pt x="567450" y="3871"/>
-                  <a:pt x="858441" y="0"/>
-                </a:cubicBezTo>
-                <a:cubicBezTo>
-                  <a:pt x="1149432" y="-3871"/>
-                  <a:pt x="1183641" y="26619"/>
-                  <a:pt x="1395674" y="0"/>
-                </a:cubicBezTo>
-                <a:cubicBezTo>
-                  <a:pt x="1607707" y="-26619"/>
-                  <a:pt x="1716805" y="-15169"/>
-                  <a:pt x="1932908" y="0"/>
-                </a:cubicBezTo>
-                <a:cubicBezTo>
-                  <a:pt x="2073291" y="-30553"/>
-                  <a:pt x="2210746" y="97522"/>
-                  <a:pt x="2204269" y="271361"/>
-                </a:cubicBezTo>
-                <a:cubicBezTo>
-                  <a:pt x="2182057" y="425483"/>
-                  <a:pt x="2194462" y="613208"/>
-                  <a:pt x="2204269" y="792357"/>
-                </a:cubicBezTo>
-                <a:cubicBezTo>
-                  <a:pt x="2214076" y="971506"/>
-                  <a:pt x="2229091" y="1101317"/>
-                  <a:pt x="2204269" y="1356770"/>
-                </a:cubicBezTo>
-                <a:cubicBezTo>
-                  <a:pt x="2194543" y="1522729"/>
-                  <a:pt x="2067300" y="1610180"/>
-                  <a:pt x="1932908" y="1628131"/>
-                </a:cubicBezTo>
-                <a:cubicBezTo>
-                  <a:pt x="1694601" y="1651138"/>
-                  <a:pt x="1562900" y="1624912"/>
-                  <a:pt x="1412290" y="1628131"/>
-                </a:cubicBezTo>
-                <a:cubicBezTo>
-                  <a:pt x="1261680" y="1631350"/>
-                  <a:pt x="1054546" y="1616809"/>
-                  <a:pt x="858441" y="1628131"/>
-                </a:cubicBezTo>
-                <a:cubicBezTo>
-                  <a:pt x="662336" y="1639453"/>
-                  <a:pt x="531863" y="1649899"/>
-                  <a:pt x="271361" y="1628131"/>
-                </a:cubicBezTo>
-                <a:cubicBezTo>
-                  <a:pt x="131174" y="1639991"/>
-                  <a:pt x="20114" y="1489028"/>
-                  <a:pt x="0" y="1356770"/>
-                </a:cubicBezTo>
-                <a:cubicBezTo>
-                  <a:pt x="-16598" y="1238352"/>
-                  <a:pt x="-13601" y="980876"/>
-                  <a:pt x="0" y="814066"/>
-                </a:cubicBezTo>
-                <a:cubicBezTo>
-                  <a:pt x="13601" y="647256"/>
-                  <a:pt x="-20388" y="503804"/>
-                  <a:pt x="0" y="271361"/>
-                </a:cubicBezTo>
-                <a:close/>
-              </a:path>
-            </a:pathLst>
-          </a:custGeom>
-          <a:solidFill>
-            <a:srgbClr val="FF0000">
-              <a:alpha val="24000"/>
-            </a:srgbClr>
-          </a:solidFill>
-          <a:ln>
-            <a:solidFill>
-              <a:srgbClr val="C00000"/>
-            </a:solidFill>
-            <a:prstDash val="dash"/>
-            <a:extLst>
-              <a:ext uri="{C807C97D-BFC1-408E-A445-0C87EB9F89A2}">
-                <ask:lineSketchStyleProps xmlns:ask="http://schemas.microsoft.com/office/drawing/2018/sketchyshapes" sd="1219033472">
-                  <a:prstGeom prst="roundRect">
-                    <a:avLst/>
-                  </a:prstGeom>
-                  <ask:type>
-                    <ask:lineSketchFreehand/>
-                  </ask:type>
-                </ask:lineSketchStyleProps>
-              </a:ext>
-            </a:extLst>
-          </a:ln>
-        </p:spPr>
-        <p:style>
-          <a:lnRef idx="2">
-            <a:schemeClr val="accent1">
-              <a:shade val="50000"/>
-            </a:schemeClr>
-          </a:lnRef>
-          <a:fillRef idx="1">
-            <a:schemeClr val="accent1"/>
-          </a:fillRef>
-          <a:effectRef idx="0">
-            <a:schemeClr val="accent1"/>
-          </a:effectRef>
-          <a:fontRef idx="minor">
-            <a:schemeClr val="lt1"/>
-          </a:fontRef>
-        </p:style>
-        <p:txBody>
-          <a:bodyPr rtlCol="0" anchor="ctr"/>
-          <a:lstStyle/>
-          <a:p>
-            <a:pPr algn="ctr"/>
-            <a:endParaRPr lang="en-US"/>
-          </a:p>
-        </p:txBody>
-      </p:sp>
-      <p:sp>
-        <p:nvSpPr>
           <p:cNvPr id="88" name="Rounded Rectangle 87">
             <a:extLst>
               <a:ext uri="{FF2B5EF4-FFF2-40B4-BE49-F238E27FC236}">
@@ -18293,6 +18293,55 @@
               <a:rPr lang="en-US" sz="1200" dirty="0"/>
               <a:t>Compensation</a:t>
             </a:r>
+          </a:p>
+        </p:txBody>
+      </p:sp>
+      <p:sp>
+        <p:nvSpPr>
+          <p:cNvPr id="83" name="Lightning Bolt 82">
+            <a:extLst>
+              <a:ext uri="{FF2B5EF4-FFF2-40B4-BE49-F238E27FC236}">
+                <a16:creationId xmlns:a16="http://schemas.microsoft.com/office/drawing/2014/main" id="{3AC0AE3A-A914-F28B-26A5-1ADE243FEBCE}"/>
+              </a:ext>
+            </a:extLst>
+          </p:cNvPr>
+          <p:cNvSpPr/>
+          <p:nvPr/>
+        </p:nvSpPr>
+        <p:spPr>
+          <a:xfrm>
+            <a:off x="7634331" y="4541442"/>
+            <a:ext cx="205852" cy="340136"/>
+          </a:xfrm>
+          <a:prstGeom prst="lightningBolt">
+            <a:avLst/>
+          </a:prstGeom>
+          <a:solidFill>
+            <a:srgbClr val="FF0000"/>
+          </a:solidFill>
+        </p:spPr>
+        <p:style>
+          <a:lnRef idx="2">
+            <a:schemeClr val="accent1">
+              <a:shade val="50000"/>
+            </a:schemeClr>
+          </a:lnRef>
+          <a:fillRef idx="1">
+            <a:schemeClr val="accent1"/>
+          </a:fillRef>
+          <a:effectRef idx="0">
+            <a:schemeClr val="accent1"/>
+          </a:effectRef>
+          <a:fontRef idx="minor">
+            <a:schemeClr val="lt1"/>
+          </a:fontRef>
+        </p:style>
+        <p:txBody>
+          <a:bodyPr rtlCol="0" anchor="ctr"/>
+          <a:lstStyle/>
+          <a:p>
+            <a:pPr algn="ctr"/>
+            <a:endParaRPr lang="en-US"/>
           </a:p>
         </p:txBody>
       </p:sp>
@@ -23799,612 +23848,6 @@
       </p:sp>
       <p:sp>
         <p:nvSpPr>
-          <p:cNvPr id="143" name="Rectangle 142">
-            <a:extLst>
-              <a:ext uri="{FF2B5EF4-FFF2-40B4-BE49-F238E27FC236}">
-                <a16:creationId xmlns:a16="http://schemas.microsoft.com/office/drawing/2014/main" id="{0CFAC514-229C-4940-82D2-28A277992D92}"/>
-              </a:ext>
-            </a:extLst>
-          </p:cNvPr>
-          <p:cNvSpPr/>
-          <p:nvPr/>
-        </p:nvSpPr>
-        <p:spPr>
-          <a:xfrm>
-            <a:off x="8750340" y="4024711"/>
-            <a:ext cx="1149674" cy="369332"/>
-          </a:xfrm>
-          <a:prstGeom prst="rect">
-            <a:avLst/>
-          </a:prstGeom>
-        </p:spPr>
-        <p:txBody>
-          <a:bodyPr wrap="none">
-            <a:spAutoFit/>
-          </a:bodyPr>
-          <a:lstStyle/>
-          <a:p>
-            <a:pPr algn="ctr"/>
-            <a:r>
-              <a:rPr lang="en-US" sz="900" dirty="0">
-                <a:solidFill>
-                  <a:schemeClr val="tx1">
-                    <a:lumMod val="50000"/>
-                  </a:schemeClr>
-                </a:solidFill>
-                <a:latin typeface="Menlo" panose="020B0609030804020204" pitchFamily="49" charset="0"/>
-              </a:rPr>
-              <a:t>VoyageAssigned</a:t>
-            </a:r>
-            <a:br>
-              <a:rPr lang="en-US" sz="900" dirty="0">
-                <a:solidFill>
-                  <a:schemeClr val="tx1">
-                    <a:lumMod val="50000"/>
-                  </a:schemeClr>
-                </a:solidFill>
-                <a:latin typeface="Menlo" panose="020B0609030804020204" pitchFamily="49" charset="0"/>
-              </a:rPr>
-            </a:br>
-            <a:r>
-              <a:rPr lang="en-US" sz="900" b="0" dirty="0">
-                <a:solidFill>
-                  <a:schemeClr val="tx1">
-                    <a:lumMod val="50000"/>
-                  </a:schemeClr>
-                </a:solidFill>
-                <a:effectLst/>
-                <a:latin typeface="Menlo" panose="020B0609030804020204" pitchFamily="49" charset="0"/>
-              </a:rPr>
-              <a:t>event</a:t>
-            </a:r>
-          </a:p>
-        </p:txBody>
-      </p:sp>
-      <p:cxnSp>
-        <p:nvCxnSpPr>
-          <p:cNvPr id="144" name="Straight Arrow Connector 143">
-            <a:extLst>
-              <a:ext uri="{FF2B5EF4-FFF2-40B4-BE49-F238E27FC236}">
-                <a16:creationId xmlns:a16="http://schemas.microsoft.com/office/drawing/2014/main" id="{960D96AE-7311-2644-B146-8ACD4663A212}"/>
-              </a:ext>
-            </a:extLst>
-          </p:cNvPr>
-          <p:cNvCxnSpPr>
-            <a:cxnSpLocks/>
-          </p:cNvCxnSpPr>
-          <p:nvPr/>
-        </p:nvCxnSpPr>
-        <p:spPr>
-          <a:xfrm>
-            <a:off x="5012358" y="4181307"/>
-            <a:ext cx="6265243" cy="28070"/>
-          </a:xfrm>
-          <a:prstGeom prst="straightConnector1">
-            <a:avLst/>
-          </a:prstGeom>
-          <a:ln>
-            <a:headEnd type="triangle"/>
-            <a:tailEnd type="none"/>
-          </a:ln>
-        </p:spPr>
-        <p:style>
-          <a:lnRef idx="1">
-            <a:schemeClr val="accent1"/>
-          </a:lnRef>
-          <a:fillRef idx="0">
-            <a:schemeClr val="accent1"/>
-          </a:fillRef>
-          <a:effectRef idx="0">
-            <a:schemeClr val="accent1"/>
-          </a:effectRef>
-          <a:fontRef idx="minor">
-            <a:schemeClr val="tx1"/>
-          </a:fontRef>
-        </p:style>
-      </p:cxnSp>
-      <p:grpSp>
-        <p:nvGrpSpPr>
-          <p:cNvPr id="145" name="Group 144">
-            <a:extLst>
-              <a:ext uri="{FF2B5EF4-FFF2-40B4-BE49-F238E27FC236}">
-                <a16:creationId xmlns:a16="http://schemas.microsoft.com/office/drawing/2014/main" id="{BC2514C0-30FE-BB40-9943-2A294FB6B766}"/>
-              </a:ext>
-            </a:extLst>
-          </p:cNvPr>
-          <p:cNvGrpSpPr/>
-          <p:nvPr/>
-        </p:nvGrpSpPr>
-        <p:grpSpPr>
-          <a:xfrm>
-            <a:off x="4533073" y="4155733"/>
-            <a:ext cx="433615" cy="288669"/>
-            <a:chOff x="7970108" y="5423680"/>
-            <a:chExt cx="1878227" cy="1100688"/>
-          </a:xfrm>
-        </p:grpSpPr>
-        <p:sp>
-          <p:nvSpPr>
-            <p:cNvPr id="146" name="Process 145">
-              <a:extLst>
-                <a:ext uri="{FF2B5EF4-FFF2-40B4-BE49-F238E27FC236}">
-                  <a16:creationId xmlns:a16="http://schemas.microsoft.com/office/drawing/2014/main" id="{A011B278-86E3-3E44-9F28-5D8546684822}"/>
-                </a:ext>
-              </a:extLst>
-            </p:cNvPr>
-            <p:cNvSpPr/>
-            <p:nvPr/>
-          </p:nvSpPr>
-          <p:spPr>
-            <a:xfrm>
-              <a:off x="7970108" y="5424731"/>
-              <a:ext cx="1878227" cy="1099637"/>
-            </a:xfrm>
-            <a:custGeom>
-              <a:avLst/>
-              <a:gdLst>
-                <a:gd name="connsiteX0" fmla="*/ 0 w 1878227"/>
-                <a:gd name="connsiteY0" fmla="*/ 0 h 1099637"/>
-                <a:gd name="connsiteX1" fmla="*/ 644858 w 1878227"/>
-                <a:gd name="connsiteY1" fmla="*/ 0 h 1099637"/>
-                <a:gd name="connsiteX2" fmla="*/ 1289716 w 1878227"/>
-                <a:gd name="connsiteY2" fmla="*/ 0 h 1099637"/>
-                <a:gd name="connsiteX3" fmla="*/ 1878227 w 1878227"/>
-                <a:gd name="connsiteY3" fmla="*/ 0 h 1099637"/>
-                <a:gd name="connsiteX4" fmla="*/ 1878227 w 1878227"/>
-                <a:gd name="connsiteY4" fmla="*/ 549819 h 1099637"/>
-                <a:gd name="connsiteX5" fmla="*/ 1878227 w 1878227"/>
-                <a:gd name="connsiteY5" fmla="*/ 1099637 h 1099637"/>
-                <a:gd name="connsiteX6" fmla="*/ 1308498 w 1878227"/>
-                <a:gd name="connsiteY6" fmla="*/ 1099637 h 1099637"/>
-                <a:gd name="connsiteX7" fmla="*/ 719987 w 1878227"/>
-                <a:gd name="connsiteY7" fmla="*/ 1099637 h 1099637"/>
-                <a:gd name="connsiteX8" fmla="*/ 0 w 1878227"/>
-                <a:gd name="connsiteY8" fmla="*/ 1099637 h 1099637"/>
-                <a:gd name="connsiteX9" fmla="*/ 0 w 1878227"/>
-                <a:gd name="connsiteY9" fmla="*/ 582808 h 1099637"/>
-                <a:gd name="connsiteX10" fmla="*/ 0 w 1878227"/>
-                <a:gd name="connsiteY10" fmla="*/ 0 h 1099637"/>
-              </a:gdLst>
-              <a:ahLst/>
-              <a:cxnLst>
-                <a:cxn ang="0">
-                  <a:pos x="connsiteX0" y="connsiteY0"/>
-                </a:cxn>
-                <a:cxn ang="0">
-                  <a:pos x="connsiteX1" y="connsiteY1"/>
-                </a:cxn>
-                <a:cxn ang="0">
-                  <a:pos x="connsiteX2" y="connsiteY2"/>
-                </a:cxn>
-                <a:cxn ang="0">
-                  <a:pos x="connsiteX3" y="connsiteY3"/>
-                </a:cxn>
-                <a:cxn ang="0">
-                  <a:pos x="connsiteX4" y="connsiteY4"/>
-                </a:cxn>
-                <a:cxn ang="0">
-                  <a:pos x="connsiteX5" y="connsiteY5"/>
-                </a:cxn>
-                <a:cxn ang="0">
-                  <a:pos x="connsiteX6" y="connsiteY6"/>
-                </a:cxn>
-                <a:cxn ang="0">
-                  <a:pos x="connsiteX7" y="connsiteY7"/>
-                </a:cxn>
-                <a:cxn ang="0">
-                  <a:pos x="connsiteX8" y="connsiteY8"/>
-                </a:cxn>
-                <a:cxn ang="0">
-                  <a:pos x="connsiteX9" y="connsiteY9"/>
-                </a:cxn>
-                <a:cxn ang="0">
-                  <a:pos x="connsiteX10" y="connsiteY10"/>
-                </a:cxn>
-              </a:cxnLst>
-              <a:rect l="l" t="t" r="r" b="b"/>
-              <a:pathLst>
-                <a:path w="1878227" h="1099637" fill="none" extrusionOk="0">
-                  <a:moveTo>
-                    <a:pt x="0" y="0"/>
-                  </a:moveTo>
-                  <a:cubicBezTo>
-                    <a:pt x="207791" y="-3202"/>
-                    <a:pt x="449320" y="20849"/>
-                    <a:pt x="644858" y="0"/>
-                  </a:cubicBezTo>
-                  <a:cubicBezTo>
-                    <a:pt x="840396" y="-20849"/>
-                    <a:pt x="1043228" y="22455"/>
-                    <a:pt x="1289716" y="0"/>
-                  </a:cubicBezTo>
-                  <a:cubicBezTo>
-                    <a:pt x="1536204" y="-22455"/>
-                    <a:pt x="1626757" y="-14245"/>
-                    <a:pt x="1878227" y="0"/>
-                  </a:cubicBezTo>
-                  <a:cubicBezTo>
-                    <a:pt x="1903931" y="194696"/>
-                    <a:pt x="1884269" y="390299"/>
-                    <a:pt x="1878227" y="549819"/>
-                  </a:cubicBezTo>
-                  <a:cubicBezTo>
-                    <a:pt x="1872185" y="709339"/>
-                    <a:pt x="1868856" y="982552"/>
-                    <a:pt x="1878227" y="1099637"/>
-                  </a:cubicBezTo>
-                  <a:cubicBezTo>
-                    <a:pt x="1663617" y="1109173"/>
-                    <a:pt x="1588766" y="1101489"/>
-                    <a:pt x="1308498" y="1099637"/>
-                  </a:cubicBezTo>
-                  <a:cubicBezTo>
-                    <a:pt x="1028230" y="1097785"/>
-                    <a:pt x="967659" y="1114375"/>
-                    <a:pt x="719987" y="1099637"/>
-                  </a:cubicBezTo>
-                  <a:cubicBezTo>
-                    <a:pt x="472315" y="1084899"/>
-                    <a:pt x="250596" y="1112211"/>
-                    <a:pt x="0" y="1099637"/>
-                  </a:cubicBezTo>
-                  <a:cubicBezTo>
-                    <a:pt x="17138" y="875795"/>
-                    <a:pt x="23654" y="690694"/>
-                    <a:pt x="0" y="582808"/>
-                  </a:cubicBezTo>
-                  <a:cubicBezTo>
-                    <a:pt x="-23654" y="474922"/>
-                    <a:pt x="-28674" y="234532"/>
-                    <a:pt x="0" y="0"/>
-                  </a:cubicBezTo>
-                  <a:close/>
-                </a:path>
-                <a:path w="1878227" h="1099637" stroke="0" extrusionOk="0">
-                  <a:moveTo>
-                    <a:pt x="0" y="0"/>
-                  </a:moveTo>
-                  <a:cubicBezTo>
-                    <a:pt x="205619" y="-14069"/>
-                    <a:pt x="353850" y="-22981"/>
-                    <a:pt x="588511" y="0"/>
-                  </a:cubicBezTo>
-                  <a:cubicBezTo>
-                    <a:pt x="823172" y="22981"/>
-                    <a:pt x="903881" y="-16151"/>
-                    <a:pt x="1158240" y="0"/>
-                  </a:cubicBezTo>
-                  <a:cubicBezTo>
-                    <a:pt x="1412599" y="16151"/>
-                    <a:pt x="1675053" y="15805"/>
-                    <a:pt x="1878227" y="0"/>
-                  </a:cubicBezTo>
-                  <a:cubicBezTo>
-                    <a:pt x="1891064" y="132431"/>
-                    <a:pt x="1877567" y="346581"/>
-                    <a:pt x="1878227" y="527826"/>
-                  </a:cubicBezTo>
-                  <a:cubicBezTo>
-                    <a:pt x="1878887" y="709071"/>
-                    <a:pt x="1859920" y="887733"/>
-                    <a:pt x="1878227" y="1099637"/>
-                  </a:cubicBezTo>
-                  <a:cubicBezTo>
-                    <a:pt x="1686863" y="1122792"/>
-                    <a:pt x="1541189" y="1105026"/>
-                    <a:pt x="1233369" y="1099637"/>
-                  </a:cubicBezTo>
-                  <a:cubicBezTo>
-                    <a:pt x="925549" y="1094248"/>
-                    <a:pt x="872526" y="1096231"/>
-                    <a:pt x="607293" y="1099637"/>
-                  </a:cubicBezTo>
-                  <a:cubicBezTo>
-                    <a:pt x="342060" y="1103043"/>
-                    <a:pt x="272071" y="1128535"/>
-                    <a:pt x="0" y="1099637"/>
-                  </a:cubicBezTo>
-                  <a:cubicBezTo>
-                    <a:pt x="2977" y="949703"/>
-                    <a:pt x="-15090" y="660822"/>
-                    <a:pt x="0" y="538822"/>
-                  </a:cubicBezTo>
-                  <a:cubicBezTo>
-                    <a:pt x="15090" y="416822"/>
-                    <a:pt x="-19118" y="258618"/>
-                    <a:pt x="0" y="0"/>
-                  </a:cubicBezTo>
-                  <a:close/>
-                </a:path>
-              </a:pathLst>
-            </a:custGeom>
-            <a:solidFill>
-              <a:schemeClr val="accent1">
-                <a:lumMod val="60000"/>
-                <a:lumOff val="40000"/>
-              </a:schemeClr>
-            </a:solidFill>
-            <a:ln>
-              <a:extLst>
-                <a:ext uri="{C807C97D-BFC1-408E-A445-0C87EB9F89A2}">
-                  <ask:lineSketchStyleProps xmlns:ask="http://schemas.microsoft.com/office/drawing/2018/sketchyshapes" sd="1415987959">
-                    <a:prstGeom prst="flowChartProcess">
-                      <a:avLst/>
-                    </a:prstGeom>
-                    <ask:type>
-                      <ask:lineSketchFreehand/>
-                    </ask:type>
-                  </ask:lineSketchStyleProps>
-                </a:ext>
-              </a:extLst>
-            </a:ln>
-          </p:spPr>
-          <p:style>
-            <a:lnRef idx="2">
-              <a:schemeClr val="accent1">
-                <a:shade val="50000"/>
-              </a:schemeClr>
-            </a:lnRef>
-            <a:fillRef idx="1">
-              <a:schemeClr val="accent1"/>
-            </a:fillRef>
-            <a:effectRef idx="0">
-              <a:schemeClr val="accent1"/>
-            </a:effectRef>
-            <a:fontRef idx="minor">
-              <a:schemeClr val="lt1"/>
-            </a:fontRef>
-          </p:style>
-          <p:txBody>
-            <a:bodyPr rtlCol="0" anchor="ctr"/>
-            <a:lstStyle/>
-            <a:p>
-              <a:pPr algn="ctr"/>
-              <a:endParaRPr lang="en-US" dirty="0"/>
-            </a:p>
-          </p:txBody>
-        </p:sp>
-        <p:sp>
-          <p:nvSpPr>
-            <p:cNvPr id="147" name="Merge 146">
-              <a:extLst>
-                <a:ext uri="{FF2B5EF4-FFF2-40B4-BE49-F238E27FC236}">
-                  <a16:creationId xmlns:a16="http://schemas.microsoft.com/office/drawing/2014/main" id="{0D2E6372-4B5D-524A-A244-1AEC267E8BA5}"/>
-                </a:ext>
-              </a:extLst>
-            </p:cNvPr>
-            <p:cNvSpPr/>
-            <p:nvPr/>
-          </p:nvSpPr>
-          <p:spPr>
-            <a:xfrm>
-              <a:off x="7970108" y="5423680"/>
-              <a:ext cx="1876003" cy="673922"/>
-            </a:xfrm>
-            <a:custGeom>
-              <a:avLst/>
-              <a:gdLst>
-                <a:gd name="connsiteX0" fmla="*/ 0 w 1876003"/>
-                <a:gd name="connsiteY0" fmla="*/ 0 h 673922"/>
-                <a:gd name="connsiteX1" fmla="*/ 625334 w 1876003"/>
-                <a:gd name="connsiteY1" fmla="*/ 0 h 673922"/>
-                <a:gd name="connsiteX2" fmla="*/ 1231909 w 1876003"/>
-                <a:gd name="connsiteY2" fmla="*/ 0 h 673922"/>
-                <a:gd name="connsiteX3" fmla="*/ 1876003 w 1876003"/>
-                <a:gd name="connsiteY3" fmla="*/ 0 h 673922"/>
-                <a:gd name="connsiteX4" fmla="*/ 1397622 w 1876003"/>
-                <a:gd name="connsiteY4" fmla="*/ 343700 h 673922"/>
-                <a:gd name="connsiteX5" fmla="*/ 938001 w 1876003"/>
-                <a:gd name="connsiteY5" fmla="*/ 673922 h 673922"/>
-                <a:gd name="connsiteX6" fmla="*/ 459620 w 1876003"/>
-                <a:gd name="connsiteY6" fmla="*/ 330222 h 673922"/>
-                <a:gd name="connsiteX7" fmla="*/ 0 w 1876003"/>
-                <a:gd name="connsiteY7" fmla="*/ 0 h 673922"/>
-              </a:gdLst>
-              <a:ahLst/>
-              <a:cxnLst>
-                <a:cxn ang="0">
-                  <a:pos x="connsiteX0" y="connsiteY0"/>
-                </a:cxn>
-                <a:cxn ang="0">
-                  <a:pos x="connsiteX1" y="connsiteY1"/>
-                </a:cxn>
-                <a:cxn ang="0">
-                  <a:pos x="connsiteX2" y="connsiteY2"/>
-                </a:cxn>
-                <a:cxn ang="0">
-                  <a:pos x="connsiteX3" y="connsiteY3"/>
-                </a:cxn>
-                <a:cxn ang="0">
-                  <a:pos x="connsiteX4" y="connsiteY4"/>
-                </a:cxn>
-                <a:cxn ang="0">
-                  <a:pos x="connsiteX5" y="connsiteY5"/>
-                </a:cxn>
-                <a:cxn ang="0">
-                  <a:pos x="connsiteX6" y="connsiteY6"/>
-                </a:cxn>
-                <a:cxn ang="0">
-                  <a:pos x="connsiteX7" y="connsiteY7"/>
-                </a:cxn>
-              </a:cxnLst>
-              <a:rect l="l" t="t" r="r" b="b"/>
-              <a:pathLst>
-                <a:path w="1876003" h="673922" fill="none" extrusionOk="0">
-                  <a:moveTo>
-                    <a:pt x="0" y="0"/>
-                  </a:moveTo>
-                  <a:cubicBezTo>
-                    <a:pt x="126266" y="-11500"/>
-                    <a:pt x="433065" y="-28000"/>
-                    <a:pt x="625334" y="0"/>
-                  </a:cubicBezTo>
-                  <a:cubicBezTo>
-                    <a:pt x="817603" y="28000"/>
-                    <a:pt x="970046" y="196"/>
-                    <a:pt x="1231909" y="0"/>
-                  </a:cubicBezTo>
-                  <a:cubicBezTo>
-                    <a:pt x="1493772" y="-196"/>
-                    <a:pt x="1657693" y="19307"/>
-                    <a:pt x="1876003" y="0"/>
-                  </a:cubicBezTo>
-                  <a:cubicBezTo>
-                    <a:pt x="1689508" y="123057"/>
-                    <a:pt x="1633947" y="197971"/>
-                    <a:pt x="1397622" y="343700"/>
-                  </a:cubicBezTo>
-                  <a:cubicBezTo>
-                    <a:pt x="1161297" y="489429"/>
-                    <a:pt x="1080124" y="598492"/>
-                    <a:pt x="938001" y="673922"/>
-                  </a:cubicBezTo>
-                  <a:cubicBezTo>
-                    <a:pt x="767009" y="530179"/>
-                    <a:pt x="647179" y="458018"/>
-                    <a:pt x="459620" y="330222"/>
-                  </a:cubicBezTo>
-                  <a:cubicBezTo>
-                    <a:pt x="272061" y="202426"/>
-                    <a:pt x="160226" y="113183"/>
-                    <a:pt x="0" y="0"/>
-                  </a:cubicBezTo>
-                  <a:close/>
-                </a:path>
-                <a:path w="1876003" h="673922" stroke="0" extrusionOk="0">
-                  <a:moveTo>
-                    <a:pt x="0" y="0"/>
-                  </a:moveTo>
-                  <a:cubicBezTo>
-                    <a:pt x="275686" y="8919"/>
-                    <a:pt x="452956" y="15438"/>
-                    <a:pt x="625334" y="0"/>
-                  </a:cubicBezTo>
-                  <a:cubicBezTo>
-                    <a:pt x="797712" y="-15438"/>
-                    <a:pt x="996315" y="1378"/>
-                    <a:pt x="1213149" y="0"/>
-                  </a:cubicBezTo>
-                  <a:cubicBezTo>
-                    <a:pt x="1429984" y="-1378"/>
-                    <a:pt x="1656602" y="611"/>
-                    <a:pt x="1876003" y="0"/>
-                  </a:cubicBezTo>
-                  <a:cubicBezTo>
-                    <a:pt x="1687030" y="133105"/>
-                    <a:pt x="1605978" y="176203"/>
-                    <a:pt x="1425762" y="323483"/>
-                  </a:cubicBezTo>
-                  <a:cubicBezTo>
-                    <a:pt x="1245546" y="470762"/>
-                    <a:pt x="1040751" y="595710"/>
-                    <a:pt x="938001" y="673922"/>
-                  </a:cubicBezTo>
-                  <a:cubicBezTo>
-                    <a:pt x="723628" y="517228"/>
-                    <a:pt x="669825" y="477784"/>
-                    <a:pt x="478381" y="343700"/>
-                  </a:cubicBezTo>
-                  <a:cubicBezTo>
-                    <a:pt x="286936" y="209616"/>
-                    <a:pt x="151426" y="87416"/>
-                    <a:pt x="0" y="0"/>
-                  </a:cubicBezTo>
-                  <a:close/>
-                </a:path>
-              </a:pathLst>
-            </a:custGeom>
-            <a:solidFill>
-              <a:schemeClr val="accent1">
-                <a:lumMod val="40000"/>
-                <a:lumOff val="60000"/>
-              </a:schemeClr>
-            </a:solidFill>
-            <a:ln>
-              <a:extLst>
-                <a:ext uri="{C807C97D-BFC1-408E-A445-0C87EB9F89A2}">
-                  <ask:lineSketchStyleProps xmlns:ask="http://schemas.microsoft.com/office/drawing/2018/sketchyshapes" sd="3968420687">
-                    <a:prstGeom prst="flowChartMerge">
-                      <a:avLst/>
-                    </a:prstGeom>
-                    <ask:type>
-                      <ask:lineSketchFreehand/>
-                    </ask:type>
-                  </ask:lineSketchStyleProps>
-                </a:ext>
-              </a:extLst>
-            </a:ln>
-          </p:spPr>
-          <p:style>
-            <a:lnRef idx="2">
-              <a:schemeClr val="accent1">
-                <a:shade val="50000"/>
-              </a:schemeClr>
-            </a:lnRef>
-            <a:fillRef idx="1">
-              <a:schemeClr val="accent1"/>
-            </a:fillRef>
-            <a:effectRef idx="0">
-              <a:schemeClr val="accent1"/>
-            </a:effectRef>
-            <a:fontRef idx="minor">
-              <a:schemeClr val="lt1"/>
-            </a:fontRef>
-          </p:style>
-          <p:txBody>
-            <a:bodyPr rtlCol="0" anchor="ctr"/>
-            <a:lstStyle/>
-            <a:p>
-              <a:pPr algn="ctr"/>
-              <a:endParaRPr lang="en-US" dirty="0"/>
-            </a:p>
-          </p:txBody>
-        </p:sp>
-      </p:grpSp>
-      <p:cxnSp>
-        <p:nvCxnSpPr>
-          <p:cNvPr id="154" name="Straight Arrow Connector 153">
-            <a:extLst>
-              <a:ext uri="{FF2B5EF4-FFF2-40B4-BE49-F238E27FC236}">
-                <a16:creationId xmlns:a16="http://schemas.microsoft.com/office/drawing/2014/main" id="{E0423B37-4733-1448-8316-682F95672219}"/>
-              </a:ext>
-            </a:extLst>
-          </p:cNvPr>
-          <p:cNvCxnSpPr>
-            <a:cxnSpLocks/>
-          </p:cNvCxnSpPr>
-          <p:nvPr/>
-        </p:nvCxnSpPr>
-        <p:spPr>
-          <a:xfrm flipH="1">
-            <a:off x="5012358" y="4444402"/>
-            <a:ext cx="2400859" cy="0"/>
-          </a:xfrm>
-          <a:prstGeom prst="straightConnector1">
-            <a:avLst/>
-          </a:prstGeom>
-          <a:ln>
-            <a:headEnd type="triangle"/>
-            <a:tailEnd type="none"/>
-          </a:ln>
-        </p:spPr>
-        <p:style>
-          <a:lnRef idx="1">
-            <a:schemeClr val="accent1"/>
-          </a:lnRef>
-          <a:fillRef idx="0">
-            <a:schemeClr val="accent1"/>
-          </a:fillRef>
-          <a:effectRef idx="0">
-            <a:schemeClr val="accent1"/>
-          </a:effectRef>
-          <a:fontRef idx="minor">
-            <a:schemeClr val="tx1"/>
-          </a:fontRef>
-        </p:style>
-      </p:cxnSp>
-      <p:sp>
-        <p:nvSpPr>
           <p:cNvPr id="158" name="Rectangle 157">
             <a:extLst>
               <a:ext uri="{FF2B5EF4-FFF2-40B4-BE49-F238E27FC236}">
@@ -24489,34 +23932,38 @@
         </p:nvSpPr>
         <p:spPr>
           <a:xfrm>
-            <a:off x="7438203" y="4402559"/>
-            <a:ext cx="151048" cy="1082442"/>
+            <a:off x="7438203" y="3896670"/>
+            <a:ext cx="127961" cy="1588331"/>
           </a:xfrm>
           <a:custGeom>
             <a:avLst/>
             <a:gdLst>
-              <a:gd name="connsiteX0" fmla="*/ 0 w 151048"/>
-              <a:gd name="connsiteY0" fmla="*/ 25175 h 1082442"/>
-              <a:gd name="connsiteX1" fmla="*/ 25175 w 151048"/>
-              <a:gd name="connsiteY1" fmla="*/ 0 h 1082442"/>
-              <a:gd name="connsiteX2" fmla="*/ 125873 w 151048"/>
-              <a:gd name="connsiteY2" fmla="*/ 0 h 1082442"/>
-              <a:gd name="connsiteX3" fmla="*/ 151048 w 151048"/>
-              <a:gd name="connsiteY3" fmla="*/ 25175 h 1082442"/>
-              <a:gd name="connsiteX4" fmla="*/ 151048 w 151048"/>
-              <a:gd name="connsiteY4" fmla="*/ 510258 h 1082442"/>
-              <a:gd name="connsiteX5" fmla="*/ 151048 w 151048"/>
-              <a:gd name="connsiteY5" fmla="*/ 1057267 h 1082442"/>
-              <a:gd name="connsiteX6" fmla="*/ 125873 w 151048"/>
-              <a:gd name="connsiteY6" fmla="*/ 1082442 h 1082442"/>
-              <a:gd name="connsiteX7" fmla="*/ 25175 w 151048"/>
-              <a:gd name="connsiteY7" fmla="*/ 1082442 h 1082442"/>
-              <a:gd name="connsiteX8" fmla="*/ 0 w 151048"/>
-              <a:gd name="connsiteY8" fmla="*/ 1057267 h 1082442"/>
-              <a:gd name="connsiteX9" fmla="*/ 0 w 151048"/>
-              <a:gd name="connsiteY9" fmla="*/ 520579 h 1082442"/>
-              <a:gd name="connsiteX10" fmla="*/ 0 w 151048"/>
-              <a:gd name="connsiteY10" fmla="*/ 25175 h 1082442"/>
+              <a:gd name="connsiteX0" fmla="*/ 0 w 127961"/>
+              <a:gd name="connsiteY0" fmla="*/ 21327 h 1588331"/>
+              <a:gd name="connsiteX1" fmla="*/ 21327 w 127961"/>
+              <a:gd name="connsiteY1" fmla="*/ 0 h 1588331"/>
+              <a:gd name="connsiteX2" fmla="*/ 106634 w 127961"/>
+              <a:gd name="connsiteY2" fmla="*/ 0 h 1588331"/>
+              <a:gd name="connsiteX3" fmla="*/ 127961 w 127961"/>
+              <a:gd name="connsiteY3" fmla="*/ 21327 h 1588331"/>
+              <a:gd name="connsiteX4" fmla="*/ 127961 w 127961"/>
+              <a:gd name="connsiteY4" fmla="*/ 521096 h 1588331"/>
+              <a:gd name="connsiteX5" fmla="*/ 127961 w 127961"/>
+              <a:gd name="connsiteY5" fmla="*/ 1005408 h 1588331"/>
+              <a:gd name="connsiteX6" fmla="*/ 127961 w 127961"/>
+              <a:gd name="connsiteY6" fmla="*/ 1567004 h 1588331"/>
+              <a:gd name="connsiteX7" fmla="*/ 106634 w 127961"/>
+              <a:gd name="connsiteY7" fmla="*/ 1588331 h 1588331"/>
+              <a:gd name="connsiteX8" fmla="*/ 21327 w 127961"/>
+              <a:gd name="connsiteY8" fmla="*/ 1588331 h 1588331"/>
+              <a:gd name="connsiteX9" fmla="*/ 0 w 127961"/>
+              <a:gd name="connsiteY9" fmla="*/ 1567004 h 1588331"/>
+              <a:gd name="connsiteX10" fmla="*/ 0 w 127961"/>
+              <a:gd name="connsiteY10" fmla="*/ 1098149 h 1588331"/>
+              <a:gd name="connsiteX11" fmla="*/ 0 w 127961"/>
+              <a:gd name="connsiteY11" fmla="*/ 629293 h 1588331"/>
+              <a:gd name="connsiteX12" fmla="*/ 0 w 127961"/>
+              <a:gd name="connsiteY12" fmla="*/ 21327 h 1588331"/>
             </a:gdLst>
             <a:ahLst/>
             <a:cxnLst>
@@ -24553,118 +24000,144 @@
               <a:cxn ang="0">
                 <a:pos x="connsiteX10" y="connsiteY10"/>
               </a:cxn>
+              <a:cxn ang="0">
+                <a:pos x="connsiteX11" y="connsiteY11"/>
+              </a:cxn>
+              <a:cxn ang="0">
+                <a:pos x="connsiteX12" y="connsiteY12"/>
+              </a:cxn>
             </a:cxnLst>
             <a:rect l="l" t="t" r="r" b="b"/>
             <a:pathLst>
-              <a:path w="151048" h="1082442" fill="none" extrusionOk="0">
+              <a:path w="127961" h="1588331" fill="none" extrusionOk="0">
                 <a:moveTo>
-                  <a:pt x="0" y="25175"/>
+                  <a:pt x="0" y="21327"/>
                 </a:moveTo>
                 <a:cubicBezTo>
-                  <a:pt x="349" y="11424"/>
-                  <a:pt x="9822" y="59"/>
-                  <a:pt x="25175" y="0"/>
-                </a:cubicBezTo>
-                <a:cubicBezTo>
-                  <a:pt x="72776" y="-264"/>
-                  <a:pt x="90078" y="-1472"/>
-                  <a:pt x="125873" y="0"/>
-                </a:cubicBezTo>
-                <a:cubicBezTo>
-                  <a:pt x="138286" y="-168"/>
-                  <a:pt x="150034" y="10737"/>
-                  <a:pt x="151048" y="25175"/>
-                </a:cubicBezTo>
-                <a:cubicBezTo>
-                  <a:pt x="152565" y="257798"/>
-                  <a:pt x="159904" y="292916"/>
-                  <a:pt x="151048" y="510258"/>
-                </a:cubicBezTo>
-                <a:cubicBezTo>
-                  <a:pt x="142192" y="727600"/>
-                  <a:pt x="170694" y="809403"/>
-                  <a:pt x="151048" y="1057267"/>
-                </a:cubicBezTo>
-                <a:cubicBezTo>
-                  <a:pt x="152044" y="1071913"/>
-                  <a:pt x="136619" y="1082082"/>
-                  <a:pt x="125873" y="1082442"/>
-                </a:cubicBezTo>
-                <a:cubicBezTo>
-                  <a:pt x="79197" y="1084553"/>
-                  <a:pt x="51080" y="1081669"/>
-                  <a:pt x="25175" y="1082442"/>
-                </a:cubicBezTo>
-                <a:cubicBezTo>
-                  <a:pt x="10187" y="1084632"/>
-                  <a:pt x="-1284" y="1074123"/>
-                  <a:pt x="0" y="1057267"/>
-                </a:cubicBezTo>
-                <a:cubicBezTo>
-                  <a:pt x="15492" y="860332"/>
-                  <a:pt x="14566" y="650873"/>
-                  <a:pt x="0" y="520579"/>
-                </a:cubicBezTo>
-                <a:cubicBezTo>
-                  <a:pt x="-14566" y="390285"/>
-                  <a:pt x="8526" y="149652"/>
-                  <a:pt x="0" y="25175"/>
+                  <a:pt x="-1330" y="11696"/>
+                  <a:pt x="10850" y="96"/>
+                  <a:pt x="21327" y="0"/>
+                </a:cubicBezTo>
+                <a:cubicBezTo>
+                  <a:pt x="60754" y="-1965"/>
+                  <a:pt x="70034" y="3796"/>
+                  <a:pt x="106634" y="0"/>
+                </a:cubicBezTo>
+                <a:cubicBezTo>
+                  <a:pt x="118841" y="-1212"/>
+                  <a:pt x="127584" y="10114"/>
+                  <a:pt x="127961" y="21327"/>
+                </a:cubicBezTo>
+                <a:cubicBezTo>
+                  <a:pt x="147531" y="246002"/>
+                  <a:pt x="121030" y="300155"/>
+                  <a:pt x="127961" y="521096"/>
+                </a:cubicBezTo>
+                <a:cubicBezTo>
+                  <a:pt x="134892" y="742037"/>
+                  <a:pt x="149777" y="794387"/>
+                  <a:pt x="127961" y="1005408"/>
+                </a:cubicBezTo>
+                <a:cubicBezTo>
+                  <a:pt x="106145" y="1216429"/>
+                  <a:pt x="108839" y="1417241"/>
+                  <a:pt x="127961" y="1567004"/>
+                </a:cubicBezTo>
+                <a:cubicBezTo>
+                  <a:pt x="127399" y="1579918"/>
+                  <a:pt x="117851" y="1589622"/>
+                  <a:pt x="106634" y="1588331"/>
+                </a:cubicBezTo>
+                <a:cubicBezTo>
+                  <a:pt x="76480" y="1586718"/>
+                  <a:pt x="42860" y="1588177"/>
+                  <a:pt x="21327" y="1588331"/>
+                </a:cubicBezTo>
+                <a:cubicBezTo>
+                  <a:pt x="9352" y="1588151"/>
+                  <a:pt x="1809" y="1578898"/>
+                  <a:pt x="0" y="1567004"/>
+                </a:cubicBezTo>
+                <a:cubicBezTo>
+                  <a:pt x="11985" y="1457136"/>
+                  <a:pt x="-17346" y="1198083"/>
+                  <a:pt x="0" y="1098149"/>
+                </a:cubicBezTo>
+                <a:cubicBezTo>
+                  <a:pt x="17346" y="998216"/>
+                  <a:pt x="-21896" y="790724"/>
+                  <a:pt x="0" y="629293"/>
+                </a:cubicBezTo>
+                <a:cubicBezTo>
+                  <a:pt x="21896" y="467862"/>
+                  <a:pt x="24050" y="248424"/>
+                  <a:pt x="0" y="21327"/>
                 </a:cubicBezTo>
                 <a:close/>
               </a:path>
-              <a:path w="151048" h="1082442" stroke="0" extrusionOk="0">
+              <a:path w="127961" h="1588331" stroke="0" extrusionOk="0">
                 <a:moveTo>
-                  <a:pt x="0" y="25175"/>
+                  <a:pt x="0" y="21327"/>
                 </a:moveTo>
                 <a:cubicBezTo>
-                  <a:pt x="-2784" y="11110"/>
-                  <a:pt x="12472" y="-103"/>
-                  <a:pt x="25175" y="0"/>
-                </a:cubicBezTo>
-                <a:cubicBezTo>
-                  <a:pt x="72596" y="-999"/>
-                  <a:pt x="95128" y="2650"/>
-                  <a:pt x="125873" y="0"/>
-                </a:cubicBezTo>
-                <a:cubicBezTo>
-                  <a:pt x="140240" y="462"/>
-                  <a:pt x="148670" y="12671"/>
-                  <a:pt x="151048" y="25175"/>
-                </a:cubicBezTo>
-                <a:cubicBezTo>
-                  <a:pt x="174466" y="162050"/>
-                  <a:pt x="130783" y="347477"/>
-                  <a:pt x="151048" y="561863"/>
-                </a:cubicBezTo>
-                <a:cubicBezTo>
-                  <a:pt x="171313" y="776249"/>
-                  <a:pt x="134692" y="945381"/>
-                  <a:pt x="151048" y="1057267"/>
-                </a:cubicBezTo>
-                <a:cubicBezTo>
-                  <a:pt x="149872" y="1072135"/>
-                  <a:pt x="139921" y="1081064"/>
-                  <a:pt x="125873" y="1082442"/>
-                </a:cubicBezTo>
-                <a:cubicBezTo>
-                  <a:pt x="94608" y="1080030"/>
-                  <a:pt x="46538" y="1085444"/>
-                  <a:pt x="25175" y="1082442"/>
-                </a:cubicBezTo>
-                <a:cubicBezTo>
-                  <a:pt x="11510" y="1081534"/>
-                  <a:pt x="-1318" y="1071332"/>
-                  <a:pt x="0" y="1057267"/>
-                </a:cubicBezTo>
-                <a:cubicBezTo>
-                  <a:pt x="-12323" y="878331"/>
-                  <a:pt x="8811" y="758152"/>
-                  <a:pt x="0" y="572184"/>
-                </a:cubicBezTo>
-                <a:cubicBezTo>
-                  <a:pt x="-8811" y="386216"/>
-                  <a:pt x="-5355" y="242367"/>
-                  <a:pt x="0" y="25175"/>
+                  <a:pt x="-1831" y="9442"/>
+                  <a:pt x="9926" y="-32"/>
+                  <a:pt x="21327" y="0"/>
+                </a:cubicBezTo>
+                <a:cubicBezTo>
+                  <a:pt x="50939" y="365"/>
+                  <a:pt x="86010" y="804"/>
+                  <a:pt x="106634" y="0"/>
+                </a:cubicBezTo>
+                <a:cubicBezTo>
+                  <a:pt x="119857" y="1442"/>
+                  <a:pt x="127012" y="10107"/>
+                  <a:pt x="127961" y="21327"/>
+                </a:cubicBezTo>
+                <a:cubicBezTo>
+                  <a:pt x="154174" y="156893"/>
+                  <a:pt x="121331" y="296560"/>
+                  <a:pt x="127961" y="567466"/>
+                </a:cubicBezTo>
+                <a:cubicBezTo>
+                  <a:pt x="134591" y="838372"/>
+                  <a:pt x="129511" y="866548"/>
+                  <a:pt x="127961" y="1036322"/>
+                </a:cubicBezTo>
+                <a:cubicBezTo>
+                  <a:pt x="126411" y="1206096"/>
+                  <a:pt x="138469" y="1310785"/>
+                  <a:pt x="127961" y="1567004"/>
+                </a:cubicBezTo>
+                <a:cubicBezTo>
+                  <a:pt x="130063" y="1580260"/>
+                  <a:pt x="117769" y="1587548"/>
+                  <a:pt x="106634" y="1588331"/>
+                </a:cubicBezTo>
+                <a:cubicBezTo>
+                  <a:pt x="72590" y="1591072"/>
+                  <a:pt x="40305" y="1587497"/>
+                  <a:pt x="21327" y="1588331"/>
+                </a:cubicBezTo>
+                <a:cubicBezTo>
+                  <a:pt x="8798" y="1587980"/>
+                  <a:pt x="984" y="1576406"/>
+                  <a:pt x="0" y="1567004"/>
+                </a:cubicBezTo>
+                <a:cubicBezTo>
+                  <a:pt x="5894" y="1339464"/>
+                  <a:pt x="-22105" y="1236707"/>
+                  <a:pt x="0" y="1020865"/>
+                </a:cubicBezTo>
+                <a:cubicBezTo>
+                  <a:pt x="22105" y="805023"/>
+                  <a:pt x="24068" y="747155"/>
+                  <a:pt x="0" y="536553"/>
+                </a:cubicBezTo>
+                <a:cubicBezTo>
+                  <a:pt x="-24068" y="325951"/>
+                  <a:pt x="-23404" y="159320"/>
+                  <a:pt x="0" y="21327"/>
                 </a:cubicBezTo>
                 <a:close/>
               </a:path>
@@ -25466,6 +24939,1262 @@
           </a:fontRef>
         </p:style>
       </p:cxnSp>
+      <p:sp>
+        <p:nvSpPr>
+          <p:cNvPr id="70" name="Rectangle 69">
+            <a:extLst>
+              <a:ext uri="{FF2B5EF4-FFF2-40B4-BE49-F238E27FC236}">
+                <a16:creationId xmlns:a16="http://schemas.microsoft.com/office/drawing/2014/main" id="{02C1C18A-E166-7C3C-BBA0-1FC2247F95D2}"/>
+              </a:ext>
+            </a:extLst>
+          </p:cNvPr>
+          <p:cNvSpPr/>
+          <p:nvPr/>
+        </p:nvSpPr>
+        <p:spPr>
+          <a:xfrm>
+            <a:off x="4507582" y="4747277"/>
+            <a:ext cx="1080745" cy="369332"/>
+          </a:xfrm>
+          <a:prstGeom prst="rect">
+            <a:avLst/>
+          </a:prstGeom>
+        </p:spPr>
+        <p:txBody>
+          <a:bodyPr wrap="none">
+            <a:spAutoFit/>
+          </a:bodyPr>
+          <a:lstStyle/>
+          <a:p>
+            <a:pPr algn="ctr"/>
+            <a:r>
+              <a:rPr lang="en-US" sz="900" b="0" dirty="0">
+                <a:solidFill>
+                  <a:schemeClr val="tx1">
+                    <a:lumMod val="50000"/>
+                  </a:schemeClr>
+                </a:solidFill>
+                <a:effectLst/>
+                <a:latin typeface="Menlo" panose="020B0609030804020204" pitchFamily="49" charset="0"/>
+              </a:rPr>
+              <a:t>OrderRejected</a:t>
+            </a:r>
+            <a:br>
+              <a:rPr lang="en-US" sz="900" b="0" dirty="0">
+                <a:solidFill>
+                  <a:schemeClr val="tx1">
+                    <a:lumMod val="50000"/>
+                  </a:schemeClr>
+                </a:solidFill>
+                <a:effectLst/>
+                <a:latin typeface="Menlo" panose="020B0609030804020204" pitchFamily="49" charset="0"/>
+              </a:rPr>
+            </a:br>
+            <a:r>
+              <a:rPr lang="en-US" sz="900" b="0" dirty="0">
+                <a:solidFill>
+                  <a:schemeClr val="tx1">
+                    <a:lumMod val="50000"/>
+                  </a:schemeClr>
+                </a:solidFill>
+                <a:effectLst/>
+                <a:latin typeface="Menlo" panose="020B0609030804020204" pitchFamily="49" charset="0"/>
+              </a:rPr>
+              <a:t>event</a:t>
+            </a:r>
+          </a:p>
+        </p:txBody>
+      </p:sp>
+      <p:sp>
+        <p:nvSpPr>
+          <p:cNvPr id="76" name="Process 75">
+            <a:extLst>
+              <a:ext uri="{FF2B5EF4-FFF2-40B4-BE49-F238E27FC236}">
+                <a16:creationId xmlns:a16="http://schemas.microsoft.com/office/drawing/2014/main" id="{1EAD12B4-8ED9-0DA1-2349-9BB4DEC40E39}"/>
+              </a:ext>
+            </a:extLst>
+          </p:cNvPr>
+          <p:cNvSpPr/>
+          <p:nvPr/>
+        </p:nvSpPr>
+        <p:spPr>
+          <a:xfrm>
+            <a:off x="5580348" y="4840371"/>
+            <a:ext cx="433615" cy="288393"/>
+          </a:xfrm>
+          <a:prstGeom prst="flowChartProcess">
+            <a:avLst/>
+          </a:prstGeom>
+          <a:solidFill>
+            <a:srgbClr val="C00000"/>
+          </a:solidFill>
+          <a:ln>
+            <a:solidFill>
+              <a:srgbClr val="C00000"/>
+            </a:solidFill>
+          </a:ln>
+        </p:spPr>
+        <p:style>
+          <a:lnRef idx="2">
+            <a:schemeClr val="accent1">
+              <a:shade val="50000"/>
+            </a:schemeClr>
+          </a:lnRef>
+          <a:fillRef idx="1">
+            <a:schemeClr val="accent1"/>
+          </a:fillRef>
+          <a:effectRef idx="0">
+            <a:schemeClr val="accent1"/>
+          </a:effectRef>
+          <a:fontRef idx="minor">
+            <a:schemeClr val="lt1"/>
+          </a:fontRef>
+        </p:style>
+        <p:txBody>
+          <a:bodyPr rtlCol="0" anchor="ctr"/>
+          <a:lstStyle/>
+          <a:p>
+            <a:pPr algn="ctr"/>
+            <a:endParaRPr lang="en-US" dirty="0"/>
+          </a:p>
+        </p:txBody>
+      </p:sp>
+      <p:sp>
+        <p:nvSpPr>
+          <p:cNvPr id="79" name="Merge 78">
+            <a:extLst>
+              <a:ext uri="{FF2B5EF4-FFF2-40B4-BE49-F238E27FC236}">
+                <a16:creationId xmlns:a16="http://schemas.microsoft.com/office/drawing/2014/main" id="{E949D54E-552C-49EA-F3D1-7AB6D681B889}"/>
+              </a:ext>
+            </a:extLst>
+          </p:cNvPr>
+          <p:cNvSpPr/>
+          <p:nvPr/>
+        </p:nvSpPr>
+        <p:spPr>
+          <a:xfrm>
+            <a:off x="5570939" y="4828054"/>
+            <a:ext cx="433102" cy="176744"/>
+          </a:xfrm>
+          <a:custGeom>
+            <a:avLst/>
+            <a:gdLst>
+              <a:gd name="connsiteX0" fmla="*/ 0 w 433102"/>
+              <a:gd name="connsiteY0" fmla="*/ 0 h 176744"/>
+              <a:gd name="connsiteX1" fmla="*/ 433102 w 433102"/>
+              <a:gd name="connsiteY1" fmla="*/ 0 h 176744"/>
+              <a:gd name="connsiteX2" fmla="*/ 216551 w 433102"/>
+              <a:gd name="connsiteY2" fmla="*/ 176744 h 176744"/>
+              <a:gd name="connsiteX3" fmla="*/ 0 w 433102"/>
+              <a:gd name="connsiteY3" fmla="*/ 0 h 176744"/>
+            </a:gdLst>
+            <a:ahLst/>
+            <a:cxnLst>
+              <a:cxn ang="0">
+                <a:pos x="connsiteX0" y="connsiteY0"/>
+              </a:cxn>
+              <a:cxn ang="0">
+                <a:pos x="connsiteX1" y="connsiteY1"/>
+              </a:cxn>
+              <a:cxn ang="0">
+                <a:pos x="connsiteX2" y="connsiteY2"/>
+              </a:cxn>
+              <a:cxn ang="0">
+                <a:pos x="connsiteX3" y="connsiteY3"/>
+              </a:cxn>
+            </a:cxnLst>
+            <a:rect l="l" t="t" r="r" b="b"/>
+            <a:pathLst>
+              <a:path w="433102" h="176744" fill="none" extrusionOk="0">
+                <a:moveTo>
+                  <a:pt x="0" y="0"/>
+                </a:moveTo>
+                <a:cubicBezTo>
+                  <a:pt x="143857" y="21589"/>
+                  <a:pt x="270855" y="-8077"/>
+                  <a:pt x="433102" y="0"/>
+                </a:cubicBezTo>
+                <a:cubicBezTo>
+                  <a:pt x="393451" y="46962"/>
+                  <a:pt x="313025" y="95727"/>
+                  <a:pt x="216551" y="176744"/>
+                </a:cubicBezTo>
+                <a:cubicBezTo>
+                  <a:pt x="120181" y="91670"/>
+                  <a:pt x="84212" y="57565"/>
+                  <a:pt x="0" y="0"/>
+                </a:cubicBezTo>
+                <a:close/>
+              </a:path>
+              <a:path w="433102" h="176744" stroke="0" extrusionOk="0">
+                <a:moveTo>
+                  <a:pt x="0" y="0"/>
+                </a:moveTo>
+                <a:cubicBezTo>
+                  <a:pt x="131471" y="-16934"/>
+                  <a:pt x="262648" y="-5967"/>
+                  <a:pt x="433102" y="0"/>
+                </a:cubicBezTo>
+                <a:cubicBezTo>
+                  <a:pt x="386412" y="36265"/>
+                  <a:pt x="314403" y="100464"/>
+                  <a:pt x="216551" y="176744"/>
+                </a:cubicBezTo>
+                <a:cubicBezTo>
+                  <a:pt x="177501" y="129226"/>
+                  <a:pt x="89856" y="75681"/>
+                  <a:pt x="0" y="0"/>
+                </a:cubicBezTo>
+                <a:close/>
+              </a:path>
+            </a:pathLst>
+          </a:custGeom>
+          <a:solidFill>
+            <a:srgbClr val="FF0000"/>
+          </a:solidFill>
+          <a:ln>
+            <a:solidFill>
+              <a:srgbClr val="C00000"/>
+            </a:solidFill>
+            <a:extLst>
+              <a:ext uri="{C807C97D-BFC1-408E-A445-0C87EB9F89A2}">
+                <ask:lineSketchStyleProps xmlns:ask="http://schemas.microsoft.com/office/drawing/2018/sketchyshapes" sd="4271516699">
+                  <a:prstGeom prst="flowChartMerge">
+                    <a:avLst/>
+                  </a:prstGeom>
+                  <ask:type>
+                    <ask:lineSketchFreehand/>
+                  </ask:type>
+                </ask:lineSketchStyleProps>
+              </a:ext>
+            </a:extLst>
+          </a:ln>
+        </p:spPr>
+        <p:style>
+          <a:lnRef idx="2">
+            <a:schemeClr val="accent1">
+              <a:shade val="50000"/>
+            </a:schemeClr>
+          </a:lnRef>
+          <a:fillRef idx="1">
+            <a:schemeClr val="accent1"/>
+          </a:fillRef>
+          <a:effectRef idx="0">
+            <a:schemeClr val="accent1"/>
+          </a:effectRef>
+          <a:fontRef idx="minor">
+            <a:schemeClr val="lt1"/>
+          </a:fontRef>
+        </p:style>
+        <p:txBody>
+          <a:bodyPr rtlCol="0" anchor="ctr"/>
+          <a:lstStyle/>
+          <a:p>
+            <a:pPr algn="ctr"/>
+            <a:endParaRPr lang="en-US" dirty="0"/>
+          </a:p>
+        </p:txBody>
+      </p:sp>
+      <p:sp>
+        <p:nvSpPr>
+          <p:cNvPr id="80" name="Rounded Rectangle 79">
+            <a:extLst>
+              <a:ext uri="{FF2B5EF4-FFF2-40B4-BE49-F238E27FC236}">
+                <a16:creationId xmlns:a16="http://schemas.microsoft.com/office/drawing/2014/main" id="{05218773-9157-192C-7DDA-1161C5705229}"/>
+              </a:ext>
+            </a:extLst>
+          </p:cNvPr>
+          <p:cNvSpPr/>
+          <p:nvPr/>
+        </p:nvSpPr>
+        <p:spPr>
+          <a:xfrm>
+            <a:off x="9619281" y="4696242"/>
+            <a:ext cx="2204269" cy="1628131"/>
+          </a:xfrm>
+          <a:custGeom>
+            <a:avLst/>
+            <a:gdLst>
+              <a:gd name="connsiteX0" fmla="*/ 0 w 2204269"/>
+              <a:gd name="connsiteY0" fmla="*/ 271361 h 1628131"/>
+              <a:gd name="connsiteX1" fmla="*/ 271361 w 2204269"/>
+              <a:gd name="connsiteY1" fmla="*/ 0 h 1628131"/>
+              <a:gd name="connsiteX2" fmla="*/ 841825 w 2204269"/>
+              <a:gd name="connsiteY2" fmla="*/ 0 h 1628131"/>
+              <a:gd name="connsiteX3" fmla="*/ 1362444 w 2204269"/>
+              <a:gd name="connsiteY3" fmla="*/ 0 h 1628131"/>
+              <a:gd name="connsiteX4" fmla="*/ 1932908 w 2204269"/>
+              <a:gd name="connsiteY4" fmla="*/ 0 h 1628131"/>
+              <a:gd name="connsiteX5" fmla="*/ 2204269 w 2204269"/>
+              <a:gd name="connsiteY5" fmla="*/ 271361 h 1628131"/>
+              <a:gd name="connsiteX6" fmla="*/ 2204269 w 2204269"/>
+              <a:gd name="connsiteY6" fmla="*/ 792357 h 1628131"/>
+              <a:gd name="connsiteX7" fmla="*/ 2204269 w 2204269"/>
+              <a:gd name="connsiteY7" fmla="*/ 1356770 h 1628131"/>
+              <a:gd name="connsiteX8" fmla="*/ 1932908 w 2204269"/>
+              <a:gd name="connsiteY8" fmla="*/ 1628131 h 1628131"/>
+              <a:gd name="connsiteX9" fmla="*/ 1345828 w 2204269"/>
+              <a:gd name="connsiteY9" fmla="*/ 1628131 h 1628131"/>
+              <a:gd name="connsiteX10" fmla="*/ 775364 w 2204269"/>
+              <a:gd name="connsiteY10" fmla="*/ 1628131 h 1628131"/>
+              <a:gd name="connsiteX11" fmla="*/ 271361 w 2204269"/>
+              <a:gd name="connsiteY11" fmla="*/ 1628131 h 1628131"/>
+              <a:gd name="connsiteX12" fmla="*/ 0 w 2204269"/>
+              <a:gd name="connsiteY12" fmla="*/ 1356770 h 1628131"/>
+              <a:gd name="connsiteX13" fmla="*/ 0 w 2204269"/>
+              <a:gd name="connsiteY13" fmla="*/ 814066 h 1628131"/>
+              <a:gd name="connsiteX14" fmla="*/ 0 w 2204269"/>
+              <a:gd name="connsiteY14" fmla="*/ 271361 h 1628131"/>
+            </a:gdLst>
+            <a:ahLst/>
+            <a:cxnLst>
+              <a:cxn ang="0">
+                <a:pos x="connsiteX0" y="connsiteY0"/>
+              </a:cxn>
+              <a:cxn ang="0">
+                <a:pos x="connsiteX1" y="connsiteY1"/>
+              </a:cxn>
+              <a:cxn ang="0">
+                <a:pos x="connsiteX2" y="connsiteY2"/>
+              </a:cxn>
+              <a:cxn ang="0">
+                <a:pos x="connsiteX3" y="connsiteY3"/>
+              </a:cxn>
+              <a:cxn ang="0">
+                <a:pos x="connsiteX4" y="connsiteY4"/>
+              </a:cxn>
+              <a:cxn ang="0">
+                <a:pos x="connsiteX5" y="connsiteY5"/>
+              </a:cxn>
+              <a:cxn ang="0">
+                <a:pos x="connsiteX6" y="connsiteY6"/>
+              </a:cxn>
+              <a:cxn ang="0">
+                <a:pos x="connsiteX7" y="connsiteY7"/>
+              </a:cxn>
+              <a:cxn ang="0">
+                <a:pos x="connsiteX8" y="connsiteY8"/>
+              </a:cxn>
+              <a:cxn ang="0">
+                <a:pos x="connsiteX9" y="connsiteY9"/>
+              </a:cxn>
+              <a:cxn ang="0">
+                <a:pos x="connsiteX10" y="connsiteY10"/>
+              </a:cxn>
+              <a:cxn ang="0">
+                <a:pos x="connsiteX11" y="connsiteY11"/>
+              </a:cxn>
+              <a:cxn ang="0">
+                <a:pos x="connsiteX12" y="connsiteY12"/>
+              </a:cxn>
+              <a:cxn ang="0">
+                <a:pos x="connsiteX13" y="connsiteY13"/>
+              </a:cxn>
+              <a:cxn ang="0">
+                <a:pos x="connsiteX14" y="connsiteY14"/>
+              </a:cxn>
+            </a:cxnLst>
+            <a:rect l="l" t="t" r="r" b="b"/>
+            <a:pathLst>
+              <a:path w="2204269" h="1628131" fill="none" extrusionOk="0">
+                <a:moveTo>
+                  <a:pt x="0" y="271361"/>
+                </a:moveTo>
+                <a:cubicBezTo>
+                  <a:pt x="-4611" y="112092"/>
+                  <a:pt x="122443" y="-12861"/>
+                  <a:pt x="271361" y="0"/>
+                </a:cubicBezTo>
+                <a:cubicBezTo>
+                  <a:pt x="397688" y="-16383"/>
+                  <a:pt x="656993" y="517"/>
+                  <a:pt x="841825" y="0"/>
+                </a:cubicBezTo>
+                <a:cubicBezTo>
+                  <a:pt x="1026657" y="-517"/>
+                  <a:pt x="1177441" y="12132"/>
+                  <a:pt x="1362444" y="0"/>
+                </a:cubicBezTo>
+                <a:cubicBezTo>
+                  <a:pt x="1547447" y="-12132"/>
+                  <a:pt x="1687527" y="-27016"/>
+                  <a:pt x="1932908" y="0"/>
+                </a:cubicBezTo>
+                <a:cubicBezTo>
+                  <a:pt x="2107131" y="-5153"/>
+                  <a:pt x="2205009" y="128521"/>
+                  <a:pt x="2204269" y="271361"/>
+                </a:cubicBezTo>
+                <a:cubicBezTo>
+                  <a:pt x="2228557" y="519796"/>
+                  <a:pt x="2184920" y="546244"/>
+                  <a:pt x="2204269" y="792357"/>
+                </a:cubicBezTo>
+                <a:cubicBezTo>
+                  <a:pt x="2223618" y="1038470"/>
+                  <a:pt x="2181764" y="1160261"/>
+                  <a:pt x="2204269" y="1356770"/>
+                </a:cubicBezTo>
+                <a:cubicBezTo>
+                  <a:pt x="2207441" y="1496882"/>
+                  <a:pt x="2107381" y="1654734"/>
+                  <a:pt x="1932908" y="1628131"/>
+                </a:cubicBezTo>
+                <a:cubicBezTo>
+                  <a:pt x="1710769" y="1618364"/>
+                  <a:pt x="1557504" y="1639780"/>
+                  <a:pt x="1345828" y="1628131"/>
+                </a:cubicBezTo>
+                <a:cubicBezTo>
+                  <a:pt x="1134152" y="1616482"/>
+                  <a:pt x="993467" y="1631012"/>
+                  <a:pt x="775364" y="1628131"/>
+                </a:cubicBezTo>
+                <a:cubicBezTo>
+                  <a:pt x="557261" y="1625250"/>
+                  <a:pt x="442458" y="1606928"/>
+                  <a:pt x="271361" y="1628131"/>
+                </a:cubicBezTo>
+                <a:cubicBezTo>
+                  <a:pt x="111686" y="1658701"/>
+                  <a:pt x="-5748" y="1488538"/>
+                  <a:pt x="0" y="1356770"/>
+                </a:cubicBezTo>
+                <a:cubicBezTo>
+                  <a:pt x="-16816" y="1221110"/>
+                  <a:pt x="12254" y="1074535"/>
+                  <a:pt x="0" y="814066"/>
+                </a:cubicBezTo>
+                <a:cubicBezTo>
+                  <a:pt x="-12254" y="553597"/>
+                  <a:pt x="6308" y="430667"/>
+                  <a:pt x="0" y="271361"/>
+                </a:cubicBezTo>
+                <a:close/>
+              </a:path>
+              <a:path w="2204269" h="1628131" stroke="0" extrusionOk="0">
+                <a:moveTo>
+                  <a:pt x="0" y="271361"/>
+                </a:moveTo>
+                <a:cubicBezTo>
+                  <a:pt x="-21322" y="108340"/>
+                  <a:pt x="100812" y="7762"/>
+                  <a:pt x="271361" y="0"/>
+                </a:cubicBezTo>
+                <a:cubicBezTo>
+                  <a:pt x="483034" y="15321"/>
+                  <a:pt x="567450" y="3871"/>
+                  <a:pt x="858441" y="0"/>
+                </a:cubicBezTo>
+                <a:cubicBezTo>
+                  <a:pt x="1149432" y="-3871"/>
+                  <a:pt x="1183641" y="26619"/>
+                  <a:pt x="1395674" y="0"/>
+                </a:cubicBezTo>
+                <a:cubicBezTo>
+                  <a:pt x="1607707" y="-26619"/>
+                  <a:pt x="1716805" y="-15169"/>
+                  <a:pt x="1932908" y="0"/>
+                </a:cubicBezTo>
+                <a:cubicBezTo>
+                  <a:pt x="2073291" y="-30553"/>
+                  <a:pt x="2210746" y="97522"/>
+                  <a:pt x="2204269" y="271361"/>
+                </a:cubicBezTo>
+                <a:cubicBezTo>
+                  <a:pt x="2182057" y="425483"/>
+                  <a:pt x="2194462" y="613208"/>
+                  <a:pt x="2204269" y="792357"/>
+                </a:cubicBezTo>
+                <a:cubicBezTo>
+                  <a:pt x="2214076" y="971506"/>
+                  <a:pt x="2229091" y="1101317"/>
+                  <a:pt x="2204269" y="1356770"/>
+                </a:cubicBezTo>
+                <a:cubicBezTo>
+                  <a:pt x="2194543" y="1522729"/>
+                  <a:pt x="2067300" y="1610180"/>
+                  <a:pt x="1932908" y="1628131"/>
+                </a:cubicBezTo>
+                <a:cubicBezTo>
+                  <a:pt x="1694601" y="1651138"/>
+                  <a:pt x="1562900" y="1624912"/>
+                  <a:pt x="1412290" y="1628131"/>
+                </a:cubicBezTo>
+                <a:cubicBezTo>
+                  <a:pt x="1261680" y="1631350"/>
+                  <a:pt x="1054546" y="1616809"/>
+                  <a:pt x="858441" y="1628131"/>
+                </a:cubicBezTo>
+                <a:cubicBezTo>
+                  <a:pt x="662336" y="1639453"/>
+                  <a:pt x="531863" y="1649899"/>
+                  <a:pt x="271361" y="1628131"/>
+                </a:cubicBezTo>
+                <a:cubicBezTo>
+                  <a:pt x="131174" y="1639991"/>
+                  <a:pt x="20114" y="1489028"/>
+                  <a:pt x="0" y="1356770"/>
+                </a:cubicBezTo>
+                <a:cubicBezTo>
+                  <a:pt x="-16598" y="1238352"/>
+                  <a:pt x="-13601" y="980876"/>
+                  <a:pt x="0" y="814066"/>
+                </a:cubicBezTo>
+                <a:cubicBezTo>
+                  <a:pt x="13601" y="647256"/>
+                  <a:pt x="-20388" y="503804"/>
+                  <a:pt x="0" y="271361"/>
+                </a:cubicBezTo>
+                <a:close/>
+              </a:path>
+            </a:pathLst>
+          </a:custGeom>
+          <a:solidFill>
+            <a:srgbClr val="FF0000">
+              <a:alpha val="24000"/>
+            </a:srgbClr>
+          </a:solidFill>
+          <a:ln>
+            <a:solidFill>
+              <a:srgbClr val="C00000"/>
+            </a:solidFill>
+            <a:prstDash val="dash"/>
+            <a:extLst>
+              <a:ext uri="{C807C97D-BFC1-408E-A445-0C87EB9F89A2}">
+                <ask:lineSketchStyleProps xmlns:ask="http://schemas.microsoft.com/office/drawing/2018/sketchyshapes" sd="1219033472">
+                  <a:prstGeom prst="roundRect">
+                    <a:avLst/>
+                  </a:prstGeom>
+                  <ask:type>
+                    <ask:lineSketchFreehand/>
+                  </ask:type>
+                </ask:lineSketchStyleProps>
+              </a:ext>
+            </a:extLst>
+          </a:ln>
+        </p:spPr>
+        <p:style>
+          <a:lnRef idx="2">
+            <a:schemeClr val="accent1">
+              <a:shade val="50000"/>
+            </a:schemeClr>
+          </a:lnRef>
+          <a:fillRef idx="1">
+            <a:schemeClr val="accent1"/>
+          </a:fillRef>
+          <a:effectRef idx="0">
+            <a:schemeClr val="accent1"/>
+          </a:effectRef>
+          <a:fontRef idx="minor">
+            <a:schemeClr val="lt1"/>
+          </a:fontRef>
+        </p:style>
+        <p:txBody>
+          <a:bodyPr rtlCol="0" anchor="ctr"/>
+          <a:lstStyle/>
+          <a:p>
+            <a:pPr algn="ctr"/>
+            <a:endParaRPr lang="en-US"/>
+          </a:p>
+        </p:txBody>
+      </p:sp>
+      <p:sp>
+        <p:nvSpPr>
+          <p:cNvPr id="81" name="Rounded Rectangle 80">
+            <a:extLst>
+              <a:ext uri="{FF2B5EF4-FFF2-40B4-BE49-F238E27FC236}">
+                <a16:creationId xmlns:a16="http://schemas.microsoft.com/office/drawing/2014/main" id="{788F4FB4-6A92-BD1E-582F-2452D2E6D780}"/>
+              </a:ext>
+            </a:extLst>
+          </p:cNvPr>
+          <p:cNvSpPr/>
+          <p:nvPr/>
+        </p:nvSpPr>
+        <p:spPr>
+          <a:xfrm>
+            <a:off x="9938041" y="6117093"/>
+            <a:ext cx="1222732" cy="214130"/>
+          </a:xfrm>
+          <a:custGeom>
+            <a:avLst/>
+            <a:gdLst>
+              <a:gd name="connsiteX0" fmla="*/ 0 w 1222732"/>
+              <a:gd name="connsiteY0" fmla="*/ 35689 h 214130"/>
+              <a:gd name="connsiteX1" fmla="*/ 35689 w 1222732"/>
+              <a:gd name="connsiteY1" fmla="*/ 0 h 214130"/>
+              <a:gd name="connsiteX2" fmla="*/ 576825 w 1222732"/>
+              <a:gd name="connsiteY2" fmla="*/ 0 h 214130"/>
+              <a:gd name="connsiteX3" fmla="*/ 1187043 w 1222732"/>
+              <a:gd name="connsiteY3" fmla="*/ 0 h 214130"/>
+              <a:gd name="connsiteX4" fmla="*/ 1222732 w 1222732"/>
+              <a:gd name="connsiteY4" fmla="*/ 35689 h 214130"/>
+              <a:gd name="connsiteX5" fmla="*/ 1222732 w 1222732"/>
+              <a:gd name="connsiteY5" fmla="*/ 178441 h 214130"/>
+              <a:gd name="connsiteX6" fmla="*/ 1187043 w 1222732"/>
+              <a:gd name="connsiteY6" fmla="*/ 214130 h 214130"/>
+              <a:gd name="connsiteX7" fmla="*/ 611366 w 1222732"/>
+              <a:gd name="connsiteY7" fmla="*/ 214130 h 214130"/>
+              <a:gd name="connsiteX8" fmla="*/ 35689 w 1222732"/>
+              <a:gd name="connsiteY8" fmla="*/ 214130 h 214130"/>
+              <a:gd name="connsiteX9" fmla="*/ 0 w 1222732"/>
+              <a:gd name="connsiteY9" fmla="*/ 178441 h 214130"/>
+              <a:gd name="connsiteX10" fmla="*/ 0 w 1222732"/>
+              <a:gd name="connsiteY10" fmla="*/ 35689 h 214130"/>
+            </a:gdLst>
+            <a:ahLst/>
+            <a:cxnLst>
+              <a:cxn ang="0">
+                <a:pos x="connsiteX0" y="connsiteY0"/>
+              </a:cxn>
+              <a:cxn ang="0">
+                <a:pos x="connsiteX1" y="connsiteY1"/>
+              </a:cxn>
+              <a:cxn ang="0">
+                <a:pos x="connsiteX2" y="connsiteY2"/>
+              </a:cxn>
+              <a:cxn ang="0">
+                <a:pos x="connsiteX3" y="connsiteY3"/>
+              </a:cxn>
+              <a:cxn ang="0">
+                <a:pos x="connsiteX4" y="connsiteY4"/>
+              </a:cxn>
+              <a:cxn ang="0">
+                <a:pos x="connsiteX5" y="connsiteY5"/>
+              </a:cxn>
+              <a:cxn ang="0">
+                <a:pos x="connsiteX6" y="connsiteY6"/>
+              </a:cxn>
+              <a:cxn ang="0">
+                <a:pos x="connsiteX7" y="connsiteY7"/>
+              </a:cxn>
+              <a:cxn ang="0">
+                <a:pos x="connsiteX8" y="connsiteY8"/>
+              </a:cxn>
+              <a:cxn ang="0">
+                <a:pos x="connsiteX9" y="connsiteY9"/>
+              </a:cxn>
+              <a:cxn ang="0">
+                <a:pos x="connsiteX10" y="connsiteY10"/>
+              </a:cxn>
+            </a:cxnLst>
+            <a:rect l="l" t="t" r="r" b="b"/>
+            <a:pathLst>
+              <a:path w="1222732" h="214130" fill="none" extrusionOk="0">
+                <a:moveTo>
+                  <a:pt x="0" y="35689"/>
+                </a:moveTo>
+                <a:cubicBezTo>
+                  <a:pt x="1789" y="19358"/>
+                  <a:pt x="19522" y="2265"/>
+                  <a:pt x="35689" y="0"/>
+                </a:cubicBezTo>
+                <a:cubicBezTo>
+                  <a:pt x="207665" y="12056"/>
+                  <a:pt x="359046" y="20639"/>
+                  <a:pt x="576825" y="0"/>
+                </a:cubicBezTo>
+                <a:cubicBezTo>
+                  <a:pt x="794604" y="-20639"/>
+                  <a:pt x="895419" y="-10126"/>
+                  <a:pt x="1187043" y="0"/>
+                </a:cubicBezTo>
+                <a:cubicBezTo>
+                  <a:pt x="1206024" y="-472"/>
+                  <a:pt x="1226986" y="13695"/>
+                  <a:pt x="1222732" y="35689"/>
+                </a:cubicBezTo>
+                <a:cubicBezTo>
+                  <a:pt x="1228117" y="88003"/>
+                  <a:pt x="1220442" y="120455"/>
+                  <a:pt x="1222732" y="178441"/>
+                </a:cubicBezTo>
+                <a:cubicBezTo>
+                  <a:pt x="1221189" y="199132"/>
+                  <a:pt x="1202461" y="213356"/>
+                  <a:pt x="1187043" y="214130"/>
+                </a:cubicBezTo>
+                <a:cubicBezTo>
+                  <a:pt x="1033527" y="221413"/>
+                  <a:pt x="882573" y="240489"/>
+                  <a:pt x="611366" y="214130"/>
+                </a:cubicBezTo>
+                <a:cubicBezTo>
+                  <a:pt x="340159" y="187771"/>
+                  <a:pt x="213125" y="230702"/>
+                  <a:pt x="35689" y="214130"/>
+                </a:cubicBezTo>
+                <a:cubicBezTo>
+                  <a:pt x="17116" y="212866"/>
+                  <a:pt x="2363" y="197667"/>
+                  <a:pt x="0" y="178441"/>
+                </a:cubicBezTo>
+                <a:cubicBezTo>
+                  <a:pt x="-2149" y="138699"/>
+                  <a:pt x="3466" y="80861"/>
+                  <a:pt x="0" y="35689"/>
+                </a:cubicBezTo>
+                <a:close/>
+              </a:path>
+              <a:path w="1222732" h="214130" stroke="0" extrusionOk="0">
+                <a:moveTo>
+                  <a:pt x="0" y="35689"/>
+                </a:moveTo>
+                <a:cubicBezTo>
+                  <a:pt x="4031" y="18081"/>
+                  <a:pt x="16809" y="187"/>
+                  <a:pt x="35689" y="0"/>
+                </a:cubicBezTo>
+                <a:cubicBezTo>
+                  <a:pt x="198578" y="15190"/>
+                  <a:pt x="337216" y="2062"/>
+                  <a:pt x="599852" y="0"/>
+                </a:cubicBezTo>
+                <a:cubicBezTo>
+                  <a:pt x="862488" y="-2062"/>
+                  <a:pt x="1048658" y="-21604"/>
+                  <a:pt x="1187043" y="0"/>
+                </a:cubicBezTo>
+                <a:cubicBezTo>
+                  <a:pt x="1210931" y="2143"/>
+                  <a:pt x="1223634" y="20643"/>
+                  <a:pt x="1222732" y="35689"/>
+                </a:cubicBezTo>
+                <a:cubicBezTo>
+                  <a:pt x="1221549" y="77125"/>
+                  <a:pt x="1224346" y="107967"/>
+                  <a:pt x="1222732" y="178441"/>
+                </a:cubicBezTo>
+                <a:cubicBezTo>
+                  <a:pt x="1220868" y="196203"/>
+                  <a:pt x="1206399" y="211151"/>
+                  <a:pt x="1187043" y="214130"/>
+                </a:cubicBezTo>
+                <a:cubicBezTo>
+                  <a:pt x="1045563" y="236673"/>
+                  <a:pt x="788344" y="190322"/>
+                  <a:pt x="611366" y="214130"/>
+                </a:cubicBezTo>
+                <a:cubicBezTo>
+                  <a:pt x="434388" y="237938"/>
+                  <a:pt x="218929" y="226265"/>
+                  <a:pt x="35689" y="214130"/>
+                </a:cubicBezTo>
+                <a:cubicBezTo>
+                  <a:pt x="15629" y="213573"/>
+                  <a:pt x="-1809" y="195700"/>
+                  <a:pt x="0" y="178441"/>
+                </a:cubicBezTo>
+                <a:cubicBezTo>
+                  <a:pt x="-6546" y="120998"/>
+                  <a:pt x="-3867" y="93932"/>
+                  <a:pt x="0" y="35689"/>
+                </a:cubicBezTo>
+                <a:close/>
+              </a:path>
+            </a:pathLst>
+          </a:custGeom>
+          <a:solidFill>
+            <a:srgbClr val="C00000"/>
+          </a:solidFill>
+          <a:ln>
+            <a:solidFill>
+              <a:srgbClr val="C00000"/>
+            </a:solidFill>
+            <a:extLst>
+              <a:ext uri="{C807C97D-BFC1-408E-A445-0C87EB9F89A2}">
+                <ask:lineSketchStyleProps xmlns:ask="http://schemas.microsoft.com/office/drawing/2018/sketchyshapes" sd="616822352">
+                  <a:prstGeom prst="roundRect">
+                    <a:avLst/>
+                  </a:prstGeom>
+                  <ask:type>
+                    <ask:lineSketchFreehand/>
+                  </ask:type>
+                </ask:lineSketchStyleProps>
+              </a:ext>
+            </a:extLst>
+          </a:ln>
+        </p:spPr>
+        <p:style>
+          <a:lnRef idx="2">
+            <a:schemeClr val="accent1">
+              <a:shade val="50000"/>
+            </a:schemeClr>
+          </a:lnRef>
+          <a:fillRef idx="1">
+            <a:schemeClr val="accent1"/>
+          </a:fillRef>
+          <a:effectRef idx="0">
+            <a:schemeClr val="accent1"/>
+          </a:effectRef>
+          <a:fontRef idx="minor">
+            <a:schemeClr val="lt1"/>
+          </a:fontRef>
+        </p:style>
+        <p:txBody>
+          <a:bodyPr rtlCol="0" anchor="ctr"/>
+          <a:lstStyle/>
+          <a:p>
+            <a:pPr algn="ctr"/>
+            <a:r>
+              <a:rPr lang="en-US" sz="1200" dirty="0"/>
+              <a:t>Compensation</a:t>
+            </a:r>
+          </a:p>
+        </p:txBody>
+      </p:sp>
+      <p:cxnSp>
+        <p:nvCxnSpPr>
+          <p:cNvPr id="82" name="Straight Arrow Connector 81">
+            <a:extLst>
+              <a:ext uri="{FF2B5EF4-FFF2-40B4-BE49-F238E27FC236}">
+                <a16:creationId xmlns:a16="http://schemas.microsoft.com/office/drawing/2014/main" id="{446F21CF-725E-15B0-9ECF-5A323C6426AF}"/>
+              </a:ext>
+            </a:extLst>
+          </p:cNvPr>
+          <p:cNvCxnSpPr>
+            <a:cxnSpLocks/>
+          </p:cNvCxnSpPr>
+          <p:nvPr/>
+        </p:nvCxnSpPr>
+        <p:spPr>
+          <a:xfrm>
+            <a:off x="6013963" y="4895850"/>
+            <a:ext cx="1399254" cy="0"/>
+          </a:xfrm>
+          <a:prstGeom prst="straightConnector1">
+            <a:avLst/>
+          </a:prstGeom>
+          <a:ln>
+            <a:headEnd type="triangle"/>
+            <a:tailEnd type="none"/>
+          </a:ln>
+        </p:spPr>
+        <p:style>
+          <a:lnRef idx="1">
+            <a:schemeClr val="accent1"/>
+          </a:lnRef>
+          <a:fillRef idx="0">
+            <a:schemeClr val="accent1"/>
+          </a:fillRef>
+          <a:effectRef idx="0">
+            <a:schemeClr val="accent1"/>
+          </a:effectRef>
+          <a:fontRef idx="minor">
+            <a:schemeClr val="tx1"/>
+          </a:fontRef>
+        </p:style>
+      </p:cxnSp>
+      <p:cxnSp>
+        <p:nvCxnSpPr>
+          <p:cNvPr id="83" name="Straight Arrow Connector 82">
+            <a:extLst>
+              <a:ext uri="{FF2B5EF4-FFF2-40B4-BE49-F238E27FC236}">
+                <a16:creationId xmlns:a16="http://schemas.microsoft.com/office/drawing/2014/main" id="{274D20B0-CDCA-B15A-FC94-7EB28A96BFDE}"/>
+              </a:ext>
+            </a:extLst>
+          </p:cNvPr>
+          <p:cNvCxnSpPr>
+            <a:cxnSpLocks/>
+          </p:cNvCxnSpPr>
+          <p:nvPr/>
+        </p:nvCxnSpPr>
+        <p:spPr>
+          <a:xfrm flipH="1" flipV="1">
+            <a:off x="6013963" y="5014385"/>
+            <a:ext cx="5233369" cy="56560"/>
+          </a:xfrm>
+          <a:prstGeom prst="straightConnector1">
+            <a:avLst/>
+          </a:prstGeom>
+          <a:ln>
+            <a:headEnd type="triangle"/>
+            <a:tailEnd type="none"/>
+          </a:ln>
+        </p:spPr>
+        <p:style>
+          <a:lnRef idx="1">
+            <a:schemeClr val="accent1"/>
+          </a:lnRef>
+          <a:fillRef idx="0">
+            <a:schemeClr val="accent1"/>
+          </a:fillRef>
+          <a:effectRef idx="0">
+            <a:schemeClr val="accent1"/>
+          </a:effectRef>
+          <a:fontRef idx="minor">
+            <a:schemeClr val="tx1"/>
+          </a:fontRef>
+        </p:style>
+      </p:cxnSp>
+      <p:cxnSp>
+        <p:nvCxnSpPr>
+          <p:cNvPr id="84" name="Straight Arrow Connector 83">
+            <a:extLst>
+              <a:ext uri="{FF2B5EF4-FFF2-40B4-BE49-F238E27FC236}">
+                <a16:creationId xmlns:a16="http://schemas.microsoft.com/office/drawing/2014/main" id="{66727061-8AA3-941C-E0C9-AA86BD4CFF0C}"/>
+              </a:ext>
+            </a:extLst>
+          </p:cNvPr>
+          <p:cNvCxnSpPr>
+            <a:cxnSpLocks/>
+          </p:cNvCxnSpPr>
+          <p:nvPr/>
+        </p:nvCxnSpPr>
+        <p:spPr>
+          <a:xfrm flipH="1">
+            <a:off x="6047095" y="5121943"/>
+            <a:ext cx="3983736" cy="5086"/>
+          </a:xfrm>
+          <a:prstGeom prst="straightConnector1">
+            <a:avLst/>
+          </a:prstGeom>
+          <a:ln>
+            <a:headEnd type="triangle"/>
+            <a:tailEnd type="none"/>
+          </a:ln>
+        </p:spPr>
+        <p:style>
+          <a:lnRef idx="1">
+            <a:schemeClr val="accent1"/>
+          </a:lnRef>
+          <a:fillRef idx="0">
+            <a:schemeClr val="accent1"/>
+          </a:fillRef>
+          <a:effectRef idx="0">
+            <a:schemeClr val="accent1"/>
+          </a:effectRef>
+          <a:fontRef idx="minor">
+            <a:schemeClr val="tx1"/>
+          </a:fontRef>
+        </p:style>
+      </p:cxnSp>
+      <p:sp>
+        <p:nvSpPr>
+          <p:cNvPr id="85" name="Rounded Rectangle 84">
+            <a:extLst>
+              <a:ext uri="{FF2B5EF4-FFF2-40B4-BE49-F238E27FC236}">
+                <a16:creationId xmlns:a16="http://schemas.microsoft.com/office/drawing/2014/main" id="{A9CF5260-EA5D-E411-628D-6AC5A68B28CF}"/>
+              </a:ext>
+            </a:extLst>
+          </p:cNvPr>
+          <p:cNvSpPr/>
+          <p:nvPr/>
+        </p:nvSpPr>
+        <p:spPr>
+          <a:xfrm>
+            <a:off x="9944271" y="5142488"/>
+            <a:ext cx="173120" cy="418291"/>
+          </a:xfrm>
+          <a:custGeom>
+            <a:avLst/>
+            <a:gdLst>
+              <a:gd name="connsiteX0" fmla="*/ 0 w 173120"/>
+              <a:gd name="connsiteY0" fmla="*/ 28854 h 418291"/>
+              <a:gd name="connsiteX1" fmla="*/ 28854 w 173120"/>
+              <a:gd name="connsiteY1" fmla="*/ 0 h 418291"/>
+              <a:gd name="connsiteX2" fmla="*/ 144266 w 173120"/>
+              <a:gd name="connsiteY2" fmla="*/ 0 h 418291"/>
+              <a:gd name="connsiteX3" fmla="*/ 173120 w 173120"/>
+              <a:gd name="connsiteY3" fmla="*/ 28854 h 418291"/>
+              <a:gd name="connsiteX4" fmla="*/ 173120 w 173120"/>
+              <a:gd name="connsiteY4" fmla="*/ 389437 h 418291"/>
+              <a:gd name="connsiteX5" fmla="*/ 144266 w 173120"/>
+              <a:gd name="connsiteY5" fmla="*/ 418291 h 418291"/>
+              <a:gd name="connsiteX6" fmla="*/ 28854 w 173120"/>
+              <a:gd name="connsiteY6" fmla="*/ 418291 h 418291"/>
+              <a:gd name="connsiteX7" fmla="*/ 0 w 173120"/>
+              <a:gd name="connsiteY7" fmla="*/ 389437 h 418291"/>
+              <a:gd name="connsiteX8" fmla="*/ 0 w 173120"/>
+              <a:gd name="connsiteY8" fmla="*/ 28854 h 418291"/>
+            </a:gdLst>
+            <a:ahLst/>
+            <a:cxnLst>
+              <a:cxn ang="0">
+                <a:pos x="connsiteX0" y="connsiteY0"/>
+              </a:cxn>
+              <a:cxn ang="0">
+                <a:pos x="connsiteX1" y="connsiteY1"/>
+              </a:cxn>
+              <a:cxn ang="0">
+                <a:pos x="connsiteX2" y="connsiteY2"/>
+              </a:cxn>
+              <a:cxn ang="0">
+                <a:pos x="connsiteX3" y="connsiteY3"/>
+              </a:cxn>
+              <a:cxn ang="0">
+                <a:pos x="connsiteX4" y="connsiteY4"/>
+              </a:cxn>
+              <a:cxn ang="0">
+                <a:pos x="connsiteX5" y="connsiteY5"/>
+              </a:cxn>
+              <a:cxn ang="0">
+                <a:pos x="connsiteX6" y="connsiteY6"/>
+              </a:cxn>
+              <a:cxn ang="0">
+                <a:pos x="connsiteX7" y="connsiteY7"/>
+              </a:cxn>
+              <a:cxn ang="0">
+                <a:pos x="connsiteX8" y="connsiteY8"/>
+              </a:cxn>
+            </a:cxnLst>
+            <a:rect l="l" t="t" r="r" b="b"/>
+            <a:pathLst>
+              <a:path w="173120" h="418291" fill="none" extrusionOk="0">
+                <a:moveTo>
+                  <a:pt x="0" y="28854"/>
+                </a:moveTo>
+                <a:cubicBezTo>
+                  <a:pt x="-3224" y="14113"/>
+                  <a:pt x="13158" y="859"/>
+                  <a:pt x="28854" y="0"/>
+                </a:cubicBezTo>
+                <a:cubicBezTo>
+                  <a:pt x="79187" y="-1050"/>
+                  <a:pt x="87403" y="2048"/>
+                  <a:pt x="144266" y="0"/>
+                </a:cubicBezTo>
+                <a:cubicBezTo>
+                  <a:pt x="160130" y="1278"/>
+                  <a:pt x="175658" y="11893"/>
+                  <a:pt x="173120" y="28854"/>
+                </a:cubicBezTo>
+                <a:cubicBezTo>
+                  <a:pt x="179097" y="147014"/>
+                  <a:pt x="185536" y="294711"/>
+                  <a:pt x="173120" y="389437"/>
+                </a:cubicBezTo>
+                <a:cubicBezTo>
+                  <a:pt x="173007" y="405018"/>
+                  <a:pt x="159287" y="416956"/>
+                  <a:pt x="144266" y="418291"/>
+                </a:cubicBezTo>
+                <a:cubicBezTo>
+                  <a:pt x="108839" y="417290"/>
+                  <a:pt x="83257" y="416808"/>
+                  <a:pt x="28854" y="418291"/>
+                </a:cubicBezTo>
+                <a:cubicBezTo>
+                  <a:pt x="14457" y="419728"/>
+                  <a:pt x="-1213" y="406978"/>
+                  <a:pt x="0" y="389437"/>
+                </a:cubicBezTo>
+                <a:cubicBezTo>
+                  <a:pt x="14280" y="283534"/>
+                  <a:pt x="1832" y="178350"/>
+                  <a:pt x="0" y="28854"/>
+                </a:cubicBezTo>
+                <a:close/>
+              </a:path>
+              <a:path w="173120" h="418291" stroke="0" extrusionOk="0">
+                <a:moveTo>
+                  <a:pt x="0" y="28854"/>
+                </a:moveTo>
+                <a:cubicBezTo>
+                  <a:pt x="547" y="13009"/>
+                  <a:pt x="12402" y="-974"/>
+                  <a:pt x="28854" y="0"/>
+                </a:cubicBezTo>
+                <a:cubicBezTo>
+                  <a:pt x="64261" y="2852"/>
+                  <a:pt x="104951" y="3738"/>
+                  <a:pt x="144266" y="0"/>
+                </a:cubicBezTo>
+                <a:cubicBezTo>
+                  <a:pt x="159696" y="2613"/>
+                  <a:pt x="172239" y="12369"/>
+                  <a:pt x="173120" y="28854"/>
+                </a:cubicBezTo>
+                <a:cubicBezTo>
+                  <a:pt x="175306" y="180455"/>
+                  <a:pt x="165120" y="262423"/>
+                  <a:pt x="173120" y="389437"/>
+                </a:cubicBezTo>
+                <a:cubicBezTo>
+                  <a:pt x="170890" y="404773"/>
+                  <a:pt x="159889" y="418064"/>
+                  <a:pt x="144266" y="418291"/>
+                </a:cubicBezTo>
+                <a:cubicBezTo>
+                  <a:pt x="90590" y="418147"/>
+                  <a:pt x="62701" y="414716"/>
+                  <a:pt x="28854" y="418291"/>
+                </a:cubicBezTo>
+                <a:cubicBezTo>
+                  <a:pt x="16031" y="417326"/>
+                  <a:pt x="556" y="402418"/>
+                  <a:pt x="0" y="389437"/>
+                </a:cubicBezTo>
+                <a:cubicBezTo>
+                  <a:pt x="-4754" y="216893"/>
+                  <a:pt x="7711" y="203522"/>
+                  <a:pt x="0" y="28854"/>
+                </a:cubicBezTo>
+                <a:close/>
+              </a:path>
+            </a:pathLst>
+          </a:custGeom>
+          <a:solidFill>
+            <a:schemeClr val="accent2">
+              <a:lumMod val="60000"/>
+              <a:lumOff val="40000"/>
+            </a:schemeClr>
+          </a:solidFill>
+          <a:ln>
+            <a:noFill/>
+            <a:extLst>
+              <a:ext uri="{C807C97D-BFC1-408E-A445-0C87EB9F89A2}">
+                <ask:lineSketchStyleProps xmlns:ask="http://schemas.microsoft.com/office/drawing/2018/sketchyshapes" sd="1805087987">
+                  <a:prstGeom prst="roundRect">
+                    <a:avLst/>
+                  </a:prstGeom>
+                  <ask:type>
+                    <ask:lineSketchFreehand/>
+                  </ask:type>
+                </ask:lineSketchStyleProps>
+              </a:ext>
+            </a:extLst>
+          </a:ln>
+        </p:spPr>
+        <p:style>
+          <a:lnRef idx="2">
+            <a:schemeClr val="accent1">
+              <a:shade val="50000"/>
+            </a:schemeClr>
+          </a:lnRef>
+          <a:fillRef idx="1">
+            <a:schemeClr val="accent1"/>
+          </a:fillRef>
+          <a:effectRef idx="0">
+            <a:schemeClr val="accent1"/>
+          </a:effectRef>
+          <a:fontRef idx="minor">
+            <a:schemeClr val="lt1"/>
+          </a:fontRef>
+        </p:style>
+        <p:txBody>
+          <a:bodyPr rtlCol="0" anchor="ctr"/>
+          <a:lstStyle/>
+          <a:p>
+            <a:pPr algn="ctr"/>
+            <a:endParaRPr lang="en-US" dirty="0"/>
+          </a:p>
+        </p:txBody>
+      </p:sp>
+      <p:sp>
+        <p:nvSpPr>
+          <p:cNvPr id="86" name="Rectangle 85">
+            <a:extLst>
+              <a:ext uri="{FF2B5EF4-FFF2-40B4-BE49-F238E27FC236}">
+                <a16:creationId xmlns:a16="http://schemas.microsoft.com/office/drawing/2014/main" id="{F54B7ACC-6BAA-379B-6ADC-369E19439689}"/>
+              </a:ext>
+            </a:extLst>
+          </p:cNvPr>
+          <p:cNvSpPr/>
+          <p:nvPr/>
+        </p:nvSpPr>
+        <p:spPr>
+          <a:xfrm>
+            <a:off x="10030864" y="5627259"/>
+            <a:ext cx="942886" cy="369332"/>
+          </a:xfrm>
+          <a:prstGeom prst="rect">
+            <a:avLst/>
+          </a:prstGeom>
+        </p:spPr>
+        <p:txBody>
+          <a:bodyPr wrap="none">
+            <a:spAutoFit/>
+          </a:bodyPr>
+          <a:lstStyle/>
+          <a:p>
+            <a:pPr algn="ctr"/>
+            <a:r>
+              <a:rPr lang="en-US" sz="900" dirty="0">
+                <a:solidFill>
+                  <a:schemeClr val="tx1">
+                    <a:lumMod val="50000"/>
+                  </a:schemeClr>
+                </a:solidFill>
+                <a:latin typeface="Menlo" panose="020B0609030804020204" pitchFamily="49" charset="0"/>
+              </a:rPr>
+              <a:t>Compensate </a:t>
+            </a:r>
+          </a:p>
+          <a:p>
+            <a:pPr algn="ctr"/>
+            <a:r>
+              <a:rPr lang="en-US" sz="900" dirty="0">
+                <a:solidFill>
+                  <a:schemeClr val="tx1">
+                    <a:lumMod val="50000"/>
+                  </a:schemeClr>
+                </a:solidFill>
+                <a:latin typeface="Menlo" panose="020B0609030804020204" pitchFamily="49" charset="0"/>
+              </a:rPr>
+              <a:t>Reefer</a:t>
+            </a:r>
+            <a:endParaRPr lang="en-US" sz="900" b="0" dirty="0">
+              <a:solidFill>
+                <a:schemeClr val="tx1">
+                  <a:lumMod val="50000"/>
+                </a:schemeClr>
+              </a:solidFill>
+              <a:effectLst/>
+              <a:latin typeface="Menlo" panose="020B0609030804020204" pitchFamily="49" charset="0"/>
+            </a:endParaRPr>
+          </a:p>
+        </p:txBody>
+      </p:sp>
+      <p:sp>
+        <p:nvSpPr>
+          <p:cNvPr id="12" name="Lightning Bolt 11">
+            <a:extLst>
+              <a:ext uri="{FF2B5EF4-FFF2-40B4-BE49-F238E27FC236}">
+                <a16:creationId xmlns:a16="http://schemas.microsoft.com/office/drawing/2014/main" id="{A5F0BA77-2C9E-BD0F-6E95-4C059C79D2B6}"/>
+              </a:ext>
+            </a:extLst>
+          </p:cNvPr>
+          <p:cNvSpPr/>
+          <p:nvPr/>
+        </p:nvSpPr>
+        <p:spPr>
+          <a:xfrm>
+            <a:off x="7633895" y="4407141"/>
+            <a:ext cx="205852" cy="340136"/>
+          </a:xfrm>
+          <a:prstGeom prst="lightningBolt">
+            <a:avLst/>
+          </a:prstGeom>
+          <a:solidFill>
+            <a:srgbClr val="FF0000"/>
+          </a:solidFill>
+        </p:spPr>
+        <p:style>
+          <a:lnRef idx="2">
+            <a:schemeClr val="accent1">
+              <a:shade val="50000"/>
+            </a:schemeClr>
+          </a:lnRef>
+          <a:fillRef idx="1">
+            <a:schemeClr val="accent1"/>
+          </a:fillRef>
+          <a:effectRef idx="0">
+            <a:schemeClr val="accent1"/>
+          </a:effectRef>
+          <a:fontRef idx="minor">
+            <a:schemeClr val="lt1"/>
+          </a:fontRef>
+        </p:style>
+        <p:txBody>
+          <a:bodyPr rtlCol="0" anchor="ctr"/>
+          <a:lstStyle/>
+          <a:p>
+            <a:pPr algn="ctr"/>
+            <a:endParaRPr lang="en-US"/>
+          </a:p>
+        </p:txBody>
+      </p:sp>
     </p:spTree>
     <p:extLst>
       <p:ext uri="{BB962C8B-B14F-4D97-AF65-F5344CB8AC3E}">

</xml_diff>

<commit_message>
update on order on hold and and github action
</commit_message>
<xml_diff>
--- a/docs/SAGA_implementation.pptx
+++ b/docs/SAGA_implementation.pptx
@@ -263,7 +263,7 @@
           <a:p>
             <a:fld id="{198DD1AB-C11E-1747-BCCA-3C8476DF21EF}" type="datetimeFigureOut">
               <a:rPr lang="en-US" smtClean="0"/>
-              <a:t>5/16/22</a:t>
+              <a:t>5/17/22</a:t>
             </a:fld>
             <a:endParaRPr lang="en-US" dirty="0"/>
           </a:p>
@@ -463,7 +463,7 @@
           <a:p>
             <a:fld id="{198DD1AB-C11E-1747-BCCA-3C8476DF21EF}" type="datetimeFigureOut">
               <a:rPr lang="en-US" smtClean="0"/>
-              <a:t>5/16/22</a:t>
+              <a:t>5/17/22</a:t>
             </a:fld>
             <a:endParaRPr lang="en-US" dirty="0"/>
           </a:p>
@@ -673,7 +673,7 @@
           <a:p>
             <a:fld id="{198DD1AB-C11E-1747-BCCA-3C8476DF21EF}" type="datetimeFigureOut">
               <a:rPr lang="en-US" smtClean="0"/>
-              <a:t>5/16/22</a:t>
+              <a:t>5/17/22</a:t>
             </a:fld>
             <a:endParaRPr lang="en-US" dirty="0"/>
           </a:p>
@@ -873,7 +873,7 @@
           <a:p>
             <a:fld id="{198DD1AB-C11E-1747-BCCA-3C8476DF21EF}" type="datetimeFigureOut">
               <a:rPr lang="en-US" smtClean="0"/>
-              <a:t>5/16/22</a:t>
+              <a:t>5/17/22</a:t>
             </a:fld>
             <a:endParaRPr lang="en-US" dirty="0"/>
           </a:p>
@@ -1149,7 +1149,7 @@
           <a:p>
             <a:fld id="{198DD1AB-C11E-1747-BCCA-3C8476DF21EF}" type="datetimeFigureOut">
               <a:rPr lang="en-US" smtClean="0"/>
-              <a:t>5/16/22</a:t>
+              <a:t>5/17/22</a:t>
             </a:fld>
             <a:endParaRPr lang="en-US" dirty="0"/>
           </a:p>
@@ -1417,7 +1417,7 @@
           <a:p>
             <a:fld id="{198DD1AB-C11E-1747-BCCA-3C8476DF21EF}" type="datetimeFigureOut">
               <a:rPr lang="en-US" smtClean="0"/>
-              <a:t>5/16/22</a:t>
+              <a:t>5/17/22</a:t>
             </a:fld>
             <a:endParaRPr lang="en-US" dirty="0"/>
           </a:p>
@@ -1832,7 +1832,7 @@
           <a:p>
             <a:fld id="{198DD1AB-C11E-1747-BCCA-3C8476DF21EF}" type="datetimeFigureOut">
               <a:rPr lang="en-US" smtClean="0"/>
-              <a:t>5/16/22</a:t>
+              <a:t>5/17/22</a:t>
             </a:fld>
             <a:endParaRPr lang="en-US" dirty="0"/>
           </a:p>
@@ -1974,7 +1974,7 @@
           <a:p>
             <a:fld id="{198DD1AB-C11E-1747-BCCA-3C8476DF21EF}" type="datetimeFigureOut">
               <a:rPr lang="en-US" smtClean="0"/>
-              <a:t>5/16/22</a:t>
+              <a:t>5/17/22</a:t>
             </a:fld>
             <a:endParaRPr lang="en-US" dirty="0"/>
           </a:p>
@@ -2087,7 +2087,7 @@
           <a:p>
             <a:fld id="{198DD1AB-C11E-1747-BCCA-3C8476DF21EF}" type="datetimeFigureOut">
               <a:rPr lang="en-US" smtClean="0"/>
-              <a:t>5/16/22</a:t>
+              <a:t>5/17/22</a:t>
             </a:fld>
             <a:endParaRPr lang="en-US" dirty="0"/>
           </a:p>
@@ -2400,7 +2400,7 @@
           <a:p>
             <a:fld id="{198DD1AB-C11E-1747-BCCA-3C8476DF21EF}" type="datetimeFigureOut">
               <a:rPr lang="en-US" smtClean="0"/>
-              <a:t>5/16/22</a:t>
+              <a:t>5/17/22</a:t>
             </a:fld>
             <a:endParaRPr lang="en-US" dirty="0"/>
           </a:p>
@@ -2689,7 +2689,7 @@
           <a:p>
             <a:fld id="{198DD1AB-C11E-1747-BCCA-3C8476DF21EF}" type="datetimeFigureOut">
               <a:rPr lang="en-US" smtClean="0"/>
-              <a:t>5/16/22</a:t>
+              <a:t>5/17/22</a:t>
             </a:fld>
             <a:endParaRPr lang="en-US" dirty="0"/>
           </a:p>
@@ -2932,7 +2932,7 @@
           <a:p>
             <a:fld id="{198DD1AB-C11E-1747-BCCA-3C8476DF21EF}" type="datetimeFigureOut">
               <a:rPr lang="en-US" smtClean="0"/>
-              <a:t>5/16/22</a:t>
+              <a:t>5/17/22</a:t>
             </a:fld>
             <a:endParaRPr lang="en-US" dirty="0"/>
           </a:p>
@@ -16349,8 +16349,8 @@
         </p:nvSpPr>
         <p:spPr>
           <a:xfrm>
-            <a:off x="7633895" y="5278074"/>
-            <a:ext cx="598241" cy="369332"/>
+            <a:off x="7394320" y="5476088"/>
+            <a:ext cx="1080745" cy="230832"/>
           </a:xfrm>
           <a:prstGeom prst="rect">
             <a:avLst/>
@@ -16372,28 +16372,7 @@
                 </a:solidFill>
                 <a:latin typeface="Menlo" panose="020B0609030804020204" pitchFamily="49" charset="0"/>
               </a:rPr>
-              <a:t>Assign</a:t>
-            </a:r>
-            <a:br>
-              <a:rPr lang="en-US" sz="900" dirty="0">
-                <a:solidFill>
-                  <a:schemeClr val="tx1">
-                    <a:lumMod val="50000"/>
-                  </a:schemeClr>
-                </a:solidFill>
-                <a:latin typeface="Menlo" panose="020B0609030804020204" pitchFamily="49" charset="0"/>
-              </a:rPr>
-            </a:br>
-            <a:r>
-              <a:rPr lang="en-US" sz="900" dirty="0">
-                <a:solidFill>
-                  <a:schemeClr val="tx1">
-                    <a:lumMod val="50000"/>
-                  </a:schemeClr>
-                </a:solidFill>
-                <a:latin typeface="Menlo" panose="020B0609030804020204" pitchFamily="49" charset="0"/>
-              </a:rPr>
-              <a:t>Order</a:t>
+              <a:t>Order On Hold</a:t>
             </a:r>
             <a:endParaRPr lang="en-US" sz="900" b="0" dirty="0">
               <a:solidFill>
@@ -17400,12 +17379,17 @@
         </p:nvSpPr>
         <p:spPr>
           <a:xfrm>
-            <a:off x="4507582" y="4747277"/>
-            <a:ext cx="1080745" cy="369332"/>
+            <a:off x="4473121" y="4747277"/>
+            <a:ext cx="1149674" cy="369332"/>
           </a:xfrm>
           <a:prstGeom prst="rect">
             <a:avLst/>
           </a:prstGeom>
+          <a:solidFill>
+            <a:schemeClr val="bg1">
+              <a:lumMod val="85000"/>
+            </a:schemeClr>
+          </a:solidFill>
         </p:spPr>
         <p:txBody>
           <a:bodyPr wrap="none">
@@ -17424,7 +17408,7 @@
                 <a:effectLst/>
                 <a:latin typeface="Menlo" panose="020B0609030804020204" pitchFamily="49" charset="0"/>
               </a:rPr>
-              <a:t>OrderRejected</a:t>
+              <a:t>Order Updated</a:t>
             </a:r>
             <a:br>
               <a:rPr lang="en-US" sz="900" b="0" dirty="0">
@@ -17447,8 +17431,29 @@
                 <a:effectLst/>
                 <a:latin typeface="Menlo" panose="020B0609030804020204" pitchFamily="49" charset="0"/>
               </a:rPr>
-              <a:t>event</a:t>
+              <a:t>event - </a:t>
             </a:r>
+            <a:r>
+              <a:rPr lang="en-US" sz="900" b="0" dirty="0" err="1">
+                <a:solidFill>
+                  <a:schemeClr val="tx1">
+                    <a:lumMod val="50000"/>
+                  </a:schemeClr>
+                </a:solidFill>
+                <a:effectLst/>
+                <a:latin typeface="Menlo" panose="020B0609030804020204" pitchFamily="49" charset="0"/>
+              </a:rPr>
+              <a:t>OnHold</a:t>
+            </a:r>
+            <a:endParaRPr lang="en-US" sz="900" b="0" dirty="0">
+              <a:solidFill>
+                <a:schemeClr val="tx1">
+                  <a:lumMod val="50000"/>
+                </a:schemeClr>
+              </a:solidFill>
+              <a:effectLst/>
+              <a:latin typeface="Menlo" panose="020B0609030804020204" pitchFamily="49" charset="0"/>
+            </a:endParaRPr>
           </a:p>
         </p:txBody>
       </p:sp>
@@ -23848,78 +23853,6 @@
       </p:sp>
       <p:sp>
         <p:nvSpPr>
-          <p:cNvPr id="158" name="Rectangle 157">
-            <a:extLst>
-              <a:ext uri="{FF2B5EF4-FFF2-40B4-BE49-F238E27FC236}">
-                <a16:creationId xmlns:a16="http://schemas.microsoft.com/office/drawing/2014/main" id="{33651F68-5472-2349-A3ED-30EB29F42B46}"/>
-              </a:ext>
-            </a:extLst>
-          </p:cNvPr>
-          <p:cNvSpPr/>
-          <p:nvPr/>
-        </p:nvSpPr>
-        <p:spPr>
-          <a:xfrm>
-            <a:off x="7633895" y="5278074"/>
-            <a:ext cx="598241" cy="369332"/>
-          </a:xfrm>
-          <a:prstGeom prst="rect">
-            <a:avLst/>
-          </a:prstGeom>
-        </p:spPr>
-        <p:txBody>
-          <a:bodyPr wrap="none">
-            <a:spAutoFit/>
-          </a:bodyPr>
-          <a:lstStyle/>
-          <a:p>
-            <a:pPr algn="ctr"/>
-            <a:r>
-              <a:rPr lang="en-US" sz="900" dirty="0">
-                <a:solidFill>
-                  <a:schemeClr val="tx1">
-                    <a:lumMod val="50000"/>
-                  </a:schemeClr>
-                </a:solidFill>
-                <a:latin typeface="Menlo" panose="020B0609030804020204" pitchFamily="49" charset="0"/>
-              </a:rPr>
-              <a:t>Assign</a:t>
-            </a:r>
-            <a:br>
-              <a:rPr lang="en-US" sz="900" dirty="0">
-                <a:solidFill>
-                  <a:schemeClr val="tx1">
-                    <a:lumMod val="50000"/>
-                  </a:schemeClr>
-                </a:solidFill>
-                <a:latin typeface="Menlo" panose="020B0609030804020204" pitchFamily="49" charset="0"/>
-              </a:rPr>
-            </a:br>
-            <a:r>
-              <a:rPr lang="en-US" sz="900" dirty="0">
-                <a:solidFill>
-                  <a:schemeClr val="tx1">
-                    <a:lumMod val="50000"/>
-                  </a:schemeClr>
-                </a:solidFill>
-                <a:latin typeface="Menlo" panose="020B0609030804020204" pitchFamily="49" charset="0"/>
-              </a:rPr>
-              <a:t>Order</a:t>
-            </a:r>
-            <a:endParaRPr lang="en-US" sz="900" b="0" dirty="0">
-              <a:solidFill>
-                <a:schemeClr val="tx1">
-                  <a:lumMod val="50000"/>
-                </a:schemeClr>
-              </a:solidFill>
-              <a:effectLst/>
-              <a:latin typeface="Menlo" panose="020B0609030804020204" pitchFamily="49" charset="0"/>
-            </a:endParaRPr>
-          </a:p>
-        </p:txBody>
-      </p:sp>
-      <p:sp>
-        <p:nvSpPr>
           <p:cNvPr id="159" name="Rounded Rectangle 158">
             <a:extLst>
               <a:ext uri="{FF2B5EF4-FFF2-40B4-BE49-F238E27FC236}">
@@ -24450,7 +24383,23 @@
                   <a:schemeClr val="tx1"/>
                 </a:solidFill>
               </a:rPr>
-              <a:t>(Assigned)</a:t>
+              <a:t>(</a:t>
+            </a:r>
+            <a:r>
+              <a:rPr lang="en-US" sz="1200" dirty="0" err="1">
+                <a:solidFill>
+                  <a:schemeClr val="tx1"/>
+                </a:solidFill>
+              </a:rPr>
+              <a:t>OnHold</a:t>
+            </a:r>
+            <a:r>
+              <a:rPr lang="en-US" sz="1200" dirty="0">
+                <a:solidFill>
+                  <a:schemeClr val="tx1"/>
+                </a:solidFill>
+              </a:rPr>
+              <a:t>)</a:t>
             </a:r>
           </a:p>
         </p:txBody>
@@ -24941,72 +24890,6 @@
       </p:cxnSp>
       <p:sp>
         <p:nvSpPr>
-          <p:cNvPr id="70" name="Rectangle 69">
-            <a:extLst>
-              <a:ext uri="{FF2B5EF4-FFF2-40B4-BE49-F238E27FC236}">
-                <a16:creationId xmlns:a16="http://schemas.microsoft.com/office/drawing/2014/main" id="{02C1C18A-E166-7C3C-BBA0-1FC2247F95D2}"/>
-              </a:ext>
-            </a:extLst>
-          </p:cNvPr>
-          <p:cNvSpPr/>
-          <p:nvPr/>
-        </p:nvSpPr>
-        <p:spPr>
-          <a:xfrm>
-            <a:off x="4507582" y="4747277"/>
-            <a:ext cx="1080745" cy="369332"/>
-          </a:xfrm>
-          <a:prstGeom prst="rect">
-            <a:avLst/>
-          </a:prstGeom>
-        </p:spPr>
-        <p:txBody>
-          <a:bodyPr wrap="none">
-            <a:spAutoFit/>
-          </a:bodyPr>
-          <a:lstStyle/>
-          <a:p>
-            <a:pPr algn="ctr"/>
-            <a:r>
-              <a:rPr lang="en-US" sz="900" b="0" dirty="0">
-                <a:solidFill>
-                  <a:schemeClr val="tx1">
-                    <a:lumMod val="50000"/>
-                  </a:schemeClr>
-                </a:solidFill>
-                <a:effectLst/>
-                <a:latin typeface="Menlo" panose="020B0609030804020204" pitchFamily="49" charset="0"/>
-              </a:rPr>
-              <a:t>OrderRejected</a:t>
-            </a:r>
-            <a:br>
-              <a:rPr lang="en-US" sz="900" b="0" dirty="0">
-                <a:solidFill>
-                  <a:schemeClr val="tx1">
-                    <a:lumMod val="50000"/>
-                  </a:schemeClr>
-                </a:solidFill>
-                <a:effectLst/>
-                <a:latin typeface="Menlo" panose="020B0609030804020204" pitchFamily="49" charset="0"/>
-              </a:rPr>
-            </a:br>
-            <a:r>
-              <a:rPr lang="en-US" sz="900" b="0" dirty="0">
-                <a:solidFill>
-                  <a:schemeClr val="tx1">
-                    <a:lumMod val="50000"/>
-                  </a:schemeClr>
-                </a:solidFill>
-                <a:effectLst/>
-                <a:latin typeface="Menlo" panose="020B0609030804020204" pitchFamily="49" charset="0"/>
-              </a:rPr>
-              <a:t>event</a:t>
-            </a:r>
-          </a:p>
-        </p:txBody>
-      </p:sp>
-      <p:sp>
-        <p:nvSpPr>
           <p:cNvPr id="76" name="Process 75">
             <a:extLst>
               <a:ext uri="{FF2B5EF4-FFF2-40B4-BE49-F238E27FC236}">
@@ -26192,6 +26075,149 @@
           <a:p>
             <a:pPr algn="ctr"/>
             <a:endParaRPr lang="en-US"/>
+          </a:p>
+        </p:txBody>
+      </p:sp>
+      <p:sp>
+        <p:nvSpPr>
+          <p:cNvPr id="87" name="Rectangle 86">
+            <a:extLst>
+              <a:ext uri="{FF2B5EF4-FFF2-40B4-BE49-F238E27FC236}">
+                <a16:creationId xmlns:a16="http://schemas.microsoft.com/office/drawing/2014/main" id="{8533FD84-0AE4-F1A8-7424-7704580932BB}"/>
+              </a:ext>
+            </a:extLst>
+          </p:cNvPr>
+          <p:cNvSpPr/>
+          <p:nvPr/>
+        </p:nvSpPr>
+        <p:spPr>
+          <a:xfrm>
+            <a:off x="7394320" y="5476088"/>
+            <a:ext cx="1080745" cy="230832"/>
+          </a:xfrm>
+          <a:prstGeom prst="rect">
+            <a:avLst/>
+          </a:prstGeom>
+        </p:spPr>
+        <p:txBody>
+          <a:bodyPr wrap="none">
+            <a:spAutoFit/>
+          </a:bodyPr>
+          <a:lstStyle/>
+          <a:p>
+            <a:pPr algn="ctr"/>
+            <a:r>
+              <a:rPr lang="en-US" sz="900" dirty="0">
+                <a:solidFill>
+                  <a:schemeClr val="tx1">
+                    <a:lumMod val="50000"/>
+                  </a:schemeClr>
+                </a:solidFill>
+                <a:latin typeface="Menlo" panose="020B0609030804020204" pitchFamily="49" charset="0"/>
+              </a:rPr>
+              <a:t>Order On Hold</a:t>
+            </a:r>
+            <a:endParaRPr lang="en-US" sz="900" b="0" dirty="0">
+              <a:solidFill>
+                <a:schemeClr val="tx1">
+                  <a:lumMod val="50000"/>
+                </a:schemeClr>
+              </a:solidFill>
+              <a:effectLst/>
+              <a:latin typeface="Menlo" panose="020B0609030804020204" pitchFamily="49" charset="0"/>
+            </a:endParaRPr>
+          </a:p>
+        </p:txBody>
+      </p:sp>
+      <p:sp>
+        <p:nvSpPr>
+          <p:cNvPr id="88" name="Rectangle 87">
+            <a:extLst>
+              <a:ext uri="{FF2B5EF4-FFF2-40B4-BE49-F238E27FC236}">
+                <a16:creationId xmlns:a16="http://schemas.microsoft.com/office/drawing/2014/main" id="{6D61270D-50CB-6CF4-3227-36D4600040DC}"/>
+              </a:ext>
+            </a:extLst>
+          </p:cNvPr>
+          <p:cNvSpPr/>
+          <p:nvPr/>
+        </p:nvSpPr>
+        <p:spPr>
+          <a:xfrm>
+            <a:off x="4473121" y="4747277"/>
+            <a:ext cx="1149674" cy="369332"/>
+          </a:xfrm>
+          <a:prstGeom prst="rect">
+            <a:avLst/>
+          </a:prstGeom>
+          <a:solidFill>
+            <a:schemeClr val="bg1">
+              <a:lumMod val="85000"/>
+            </a:schemeClr>
+          </a:solidFill>
+        </p:spPr>
+        <p:txBody>
+          <a:bodyPr wrap="none">
+            <a:spAutoFit/>
+          </a:bodyPr>
+          <a:lstStyle/>
+          <a:p>
+            <a:pPr algn="ctr"/>
+            <a:r>
+              <a:rPr lang="en-US" sz="900" b="0" dirty="0">
+                <a:solidFill>
+                  <a:schemeClr val="tx1">
+                    <a:lumMod val="50000"/>
+                  </a:schemeClr>
+                </a:solidFill>
+                <a:effectLst/>
+                <a:latin typeface="Menlo" panose="020B0609030804020204" pitchFamily="49" charset="0"/>
+              </a:rPr>
+              <a:t>Order Updated</a:t>
+            </a:r>
+            <a:br>
+              <a:rPr lang="en-US" sz="900" b="0" dirty="0">
+                <a:solidFill>
+                  <a:schemeClr val="tx1">
+                    <a:lumMod val="50000"/>
+                  </a:schemeClr>
+                </a:solidFill>
+                <a:effectLst/>
+                <a:latin typeface="Menlo" panose="020B0609030804020204" pitchFamily="49" charset="0"/>
+              </a:rPr>
+            </a:br>
+            <a:r>
+              <a:rPr lang="en-US" sz="900" b="0" dirty="0">
+                <a:solidFill>
+                  <a:schemeClr val="tx1">
+                    <a:lumMod val="50000"/>
+                  </a:schemeClr>
+                </a:solidFill>
+                <a:effectLst/>
+                <a:latin typeface="Menlo" panose="020B0609030804020204" pitchFamily="49" charset="0"/>
+              </a:rPr>
+              <a:t>event - </a:t>
+            </a:r>
+            <a:r>
+              <a:rPr lang="en-US" sz="900" b="0" dirty="0" err="1">
+                <a:solidFill>
+                  <a:schemeClr val="tx1">
+                    <a:lumMod val="50000"/>
+                  </a:schemeClr>
+                </a:solidFill>
+                <a:effectLst/>
+                <a:latin typeface="Menlo" panose="020B0609030804020204" pitchFamily="49" charset="0"/>
+              </a:rPr>
+              <a:t>OnHold</a:t>
+            </a:r>
+            <a:endParaRPr lang="en-US" sz="900" b="0" dirty="0">
+              <a:solidFill>
+                <a:schemeClr val="tx1">
+                  <a:lumMod val="50000"/>
+                </a:schemeClr>
+              </a:solidFill>
+              <a:effectLst/>
+              <a:latin typeface="Menlo" panose="020B0609030804020204" pitchFamily="49" charset="0"/>
+            </a:endParaRPr>
           </a:p>
         </p:txBody>
       </p:sp>

</xml_diff>